<commit_message>
now getting results for all classifiers using random data
</commit_message>
<xml_diff>
--- a/Case/Presentation/Presentation.pptx
+++ b/Case/Presentation/Presentation.pptx
@@ -5,7 +5,7 @@
     <p:sldMasterId id="2147483648" r:id="rId1"/>
   </p:sldMasterIdLst>
   <p:notesMasterIdLst>
-    <p:notesMasterId r:id="rId15"/>
+    <p:notesMasterId r:id="rId16"/>
   </p:notesMasterIdLst>
   <p:sldIdLst>
     <p:sldId id="256" r:id="rId2"/>
@@ -18,9 +18,10 @@
     <p:sldId id="267" r:id="rId9"/>
     <p:sldId id="268" r:id="rId10"/>
     <p:sldId id="262" r:id="rId11"/>
-    <p:sldId id="264" r:id="rId12"/>
-    <p:sldId id="263" r:id="rId13"/>
-    <p:sldId id="260" r:id="rId14"/>
+    <p:sldId id="269" r:id="rId12"/>
+    <p:sldId id="264" r:id="rId13"/>
+    <p:sldId id="263" r:id="rId14"/>
+    <p:sldId id="260" r:id="rId15"/>
   </p:sldIdLst>
   <p:sldSz cx="12192000" cy="6858000"/>
   <p:notesSz cx="6858000" cy="9144000"/>
@@ -4381,10 +4382,15 @@
             <a:spLocks noGrp="1"/>
           </p:cNvSpPr>
           <p:nvPr>
-            <p:ph type="title"/>
-          </p:nvPr>
-        </p:nvSpPr>
-        <p:spPr/>
+            <p:ph type="title" idx="4294967295"/>
+          </p:nvPr>
+        </p:nvSpPr>
+        <p:spPr>
+          <a:xfrm>
+            <a:off x="0" y="365125"/>
+            <a:ext cx="10515600" cy="1325563"/>
+          </a:xfrm>
+        </p:spPr>
         <p:txBody>
           <a:bodyPr/>
           <a:lstStyle/>
@@ -4394,31 +4400,6 @@
               <a:t>Resultater</a:t>
             </a:r>
             <a:endParaRPr lang="da-DK" dirty="0"/>
-          </a:p>
-        </p:txBody>
-      </p:sp>
-      <p:sp>
-        <p:nvSpPr>
-          <p:cNvPr id="3" name="Content Placeholder 2">
-            <a:extLst>
-              <a:ext uri="{FF2B5EF4-FFF2-40B4-BE49-F238E27FC236}">
-                <a16:creationId xmlns:a16="http://schemas.microsoft.com/office/drawing/2014/main" id="{22EA6CE1-20FC-DF78-F770-F9396F4EB41B}"/>
-              </a:ext>
-            </a:extLst>
-          </p:cNvPr>
-          <p:cNvSpPr>
-            <a:spLocks noGrp="1"/>
-          </p:cNvSpPr>
-          <p:nvPr>
-            <p:ph idx="1"/>
-          </p:nvPr>
-        </p:nvSpPr>
-        <p:spPr/>
-        <p:txBody>
-          <a:bodyPr/>
-          <a:lstStyle/>
-          <a:p>
-            <a:endParaRPr lang="da-DK"/>
           </a:p>
         </p:txBody>
       </p:sp>
@@ -4454,6 +4435,496 @@
       </p:grpSpPr>
       <p:sp>
         <p:nvSpPr>
+          <p:cNvPr id="4" name="Title 3">
+            <a:extLst>
+              <a:ext uri="{FF2B5EF4-FFF2-40B4-BE49-F238E27FC236}">
+                <a16:creationId xmlns:a16="http://schemas.microsoft.com/office/drawing/2014/main" id="{2280C885-D3D1-9C7E-7EC6-75BA05288388}"/>
+              </a:ext>
+            </a:extLst>
+          </p:cNvPr>
+          <p:cNvSpPr>
+            <a:spLocks noGrp="1"/>
+          </p:cNvSpPr>
+          <p:nvPr>
+            <p:ph type="title"/>
+          </p:nvPr>
+        </p:nvSpPr>
+        <p:spPr/>
+        <p:txBody>
+          <a:bodyPr/>
+          <a:lstStyle/>
+          <a:p>
+            <a:r>
+              <a:rPr lang="en-US" dirty="0"/>
+              <a:t>Results – </a:t>
+            </a:r>
+            <a:r>
+              <a:rPr lang="en-US" dirty="0" err="1"/>
+              <a:t>Præsision</a:t>
+            </a:r>
+            <a:endParaRPr lang="da-DK" dirty="0"/>
+          </a:p>
+        </p:txBody>
+      </p:sp>
+      <p:graphicFrame>
+        <p:nvGraphicFramePr>
+          <p:cNvPr id="7" name="Table 7">
+            <a:extLst>
+              <a:ext uri="{FF2B5EF4-FFF2-40B4-BE49-F238E27FC236}">
+                <a16:creationId xmlns:a16="http://schemas.microsoft.com/office/drawing/2014/main" id="{131B2AD6-7AD5-A955-6193-6A43F1877A5D}"/>
+              </a:ext>
+            </a:extLst>
+          </p:cNvPr>
+          <p:cNvGraphicFramePr>
+            <a:graphicFrameLocks noGrp="1"/>
+          </p:cNvGraphicFramePr>
+          <p:nvPr>
+            <p:ph idx="1"/>
+            <p:extLst>
+              <p:ext uri="{D42A27DB-BD31-4B8C-83A1-F6EECF244321}">
+                <p14:modId xmlns:p14="http://schemas.microsoft.com/office/powerpoint/2010/main" val="2735230079"/>
+              </p:ext>
+            </p:extLst>
+          </p:nvPr>
+        </p:nvGraphicFramePr>
+        <p:xfrm>
+          <a:off x="826168" y="1825625"/>
+          <a:ext cx="10515597" cy="2966720"/>
+        </p:xfrm>
+        <a:graphic>
+          <a:graphicData uri="http://schemas.openxmlformats.org/drawingml/2006/table">
+            <a:tbl>
+              <a:tblPr firstRow="1" bandRow="1">
+                <a:tableStyleId>{5C22544A-7EE6-4342-B048-85BDC9FD1C3A}</a:tableStyleId>
+              </a:tblPr>
+              <a:tblGrid>
+                <a:gridCol w="3505199">
+                  <a:extLst>
+                    <a:ext uri="{9D8B030D-6E8A-4147-A177-3AD203B41FA5}">
+                      <a16:colId xmlns:a16="http://schemas.microsoft.com/office/drawing/2014/main" val="2717629490"/>
+                    </a:ext>
+                  </a:extLst>
+                </a:gridCol>
+                <a:gridCol w="3505199">
+                  <a:extLst>
+                    <a:ext uri="{9D8B030D-6E8A-4147-A177-3AD203B41FA5}">
+                      <a16:colId xmlns:a16="http://schemas.microsoft.com/office/drawing/2014/main" val="2169001319"/>
+                    </a:ext>
+                  </a:extLst>
+                </a:gridCol>
+                <a:gridCol w="3505199">
+                  <a:extLst>
+                    <a:ext uri="{9D8B030D-6E8A-4147-A177-3AD203B41FA5}">
+                      <a16:colId xmlns:a16="http://schemas.microsoft.com/office/drawing/2014/main" val="3588135148"/>
+                    </a:ext>
+                  </a:extLst>
+                </a:gridCol>
+              </a:tblGrid>
+              <a:tr h="370840">
+                <a:tc>
+                  <a:txBody>
+                    <a:bodyPr/>
+                    <a:lstStyle/>
+                    <a:p>
+                      <a:endParaRPr lang="da-DK"/>
+                    </a:p>
+                  </a:txBody>
+                  <a:tcPr/>
+                </a:tc>
+                <a:tc>
+                  <a:txBody>
+                    <a:bodyPr/>
+                    <a:lstStyle/>
+                    <a:p>
+                      <a:r>
+                        <a:rPr lang="en-US" dirty="0" err="1"/>
+                        <a:t>Currated</a:t>
+                      </a:r>
+                      <a:endParaRPr lang="da-DK" dirty="0"/>
+                    </a:p>
+                  </a:txBody>
+                  <a:tcPr/>
+                </a:tc>
+                <a:tc>
+                  <a:txBody>
+                    <a:bodyPr/>
+                    <a:lstStyle/>
+                    <a:p>
+                      <a:r>
+                        <a:rPr lang="en-US" dirty="0"/>
+                        <a:t>Random</a:t>
+                      </a:r>
+                      <a:endParaRPr lang="da-DK" dirty="0"/>
+                    </a:p>
+                  </a:txBody>
+                  <a:tcPr/>
+                </a:tc>
+                <a:extLst>
+                  <a:ext uri="{0D108BD9-81ED-4DB2-BD59-A6C34878D82A}">
+                    <a16:rowId xmlns:a16="http://schemas.microsoft.com/office/drawing/2014/main" val="140887838"/>
+                  </a:ext>
+                </a:extLst>
+              </a:tr>
+              <a:tr h="370840">
+                <a:tc>
+                  <a:txBody>
+                    <a:bodyPr/>
+                    <a:lstStyle/>
+                    <a:p>
+                      <a:r>
+                        <a:rPr lang="da-DK" dirty="0"/>
+                        <a:t>K-Nearest Neighbour</a:t>
+                      </a:r>
+                    </a:p>
+                  </a:txBody>
+                  <a:tcPr/>
+                </a:tc>
+                <a:tc>
+                  <a:txBody>
+                    <a:bodyPr/>
+                    <a:lstStyle/>
+                    <a:p>
+                      <a:r>
+                        <a:rPr lang="da-DK" dirty="0"/>
+                        <a:t>0.2802237459400938</a:t>
+                      </a:r>
+                    </a:p>
+                  </a:txBody>
+                  <a:tcPr/>
+                </a:tc>
+                <a:tc>
+                  <a:txBody>
+                    <a:bodyPr/>
+                    <a:lstStyle/>
+                    <a:p>
+                      <a:r>
+                        <a:rPr lang="da-DK" dirty="0"/>
+                        <a:t>0.8194474657385251</a:t>
+                      </a:r>
+                    </a:p>
+                  </a:txBody>
+                  <a:tcPr/>
+                </a:tc>
+                <a:extLst>
+                  <a:ext uri="{0D108BD9-81ED-4DB2-BD59-A6C34878D82A}">
+                    <a16:rowId xmlns:a16="http://schemas.microsoft.com/office/drawing/2014/main" val="4170446477"/>
+                  </a:ext>
+                </a:extLst>
+              </a:tr>
+              <a:tr h="370840">
+                <a:tc>
+                  <a:txBody>
+                    <a:bodyPr/>
+                    <a:lstStyle/>
+                    <a:p>
+                      <a:r>
+                        <a:rPr lang="da-DK" dirty="0"/>
+                        <a:t>Linear SGD</a:t>
+                      </a:r>
+                    </a:p>
+                  </a:txBody>
+                  <a:tcPr/>
+                </a:tc>
+                <a:tc>
+                  <a:txBody>
+                    <a:bodyPr/>
+                    <a:lstStyle/>
+                    <a:p>
+                      <a:r>
+                        <a:rPr lang="da-DK" dirty="0"/>
+                        <a:t>0.9648742932755925</a:t>
+                      </a:r>
+                    </a:p>
+                  </a:txBody>
+                  <a:tcPr/>
+                </a:tc>
+                <a:tc>
+                  <a:txBody>
+                    <a:bodyPr/>
+                    <a:lstStyle/>
+                    <a:p>
+                      <a:r>
+                        <a:rPr lang="da-DK" dirty="0"/>
+                        <a:t>0.9889058081357407</a:t>
+                      </a:r>
+                    </a:p>
+                  </a:txBody>
+                  <a:tcPr/>
+                </a:tc>
+                <a:extLst>
+                  <a:ext uri="{0D108BD9-81ED-4DB2-BD59-A6C34878D82A}">
+                    <a16:rowId xmlns:a16="http://schemas.microsoft.com/office/drawing/2014/main" val="3322843001"/>
+                  </a:ext>
+                </a:extLst>
+              </a:tr>
+              <a:tr h="370840">
+                <a:tc>
+                  <a:txBody>
+                    <a:bodyPr/>
+                    <a:lstStyle/>
+                    <a:p>
+                      <a:r>
+                        <a:rPr lang="da-DK" dirty="0"/>
+                        <a:t>Linear SVC</a:t>
+                      </a:r>
+                    </a:p>
+                  </a:txBody>
+                  <a:tcPr/>
+                </a:tc>
+                <a:tc>
+                  <a:txBody>
+                    <a:bodyPr/>
+                    <a:lstStyle/>
+                    <a:p>
+                      <a:r>
+                        <a:rPr lang="da-DK" dirty="0"/>
+                        <a:t>0.976482617586912</a:t>
+                      </a:r>
+                    </a:p>
+                  </a:txBody>
+                  <a:tcPr/>
+                </a:tc>
+                <a:tc>
+                  <a:txBody>
+                    <a:bodyPr/>
+                    <a:lstStyle/>
+                    <a:p>
+                      <a:r>
+                        <a:rPr lang="en-US" dirty="0"/>
+                        <a:t>1.0</a:t>
+                      </a:r>
+                      <a:endParaRPr lang="da-DK" dirty="0"/>
+                    </a:p>
+                  </a:txBody>
+                  <a:tcPr/>
+                </a:tc>
+                <a:extLst>
+                  <a:ext uri="{0D108BD9-81ED-4DB2-BD59-A6C34878D82A}">
+                    <a16:rowId xmlns:a16="http://schemas.microsoft.com/office/drawing/2014/main" val="1446874311"/>
+                  </a:ext>
+                </a:extLst>
+              </a:tr>
+              <a:tr h="370840">
+                <a:tc>
+                  <a:txBody>
+                    <a:bodyPr/>
+                    <a:lstStyle/>
+                    <a:p>
+                      <a:r>
+                        <a:rPr lang="da-DK" dirty="0"/>
+                        <a:t>SVC Linear Kernel</a:t>
+                      </a:r>
+                    </a:p>
+                  </a:txBody>
+                  <a:tcPr/>
+                </a:tc>
+                <a:tc>
+                  <a:txBody>
+                    <a:bodyPr/>
+                    <a:lstStyle/>
+                    <a:p>
+                      <a:r>
+                        <a:rPr lang="da-DK" dirty="0"/>
+                        <a:t>0.982256706363527</a:t>
+                      </a:r>
+                    </a:p>
+                  </a:txBody>
+                  <a:tcPr/>
+                </a:tc>
+                <a:tc>
+                  <a:txBody>
+                    <a:bodyPr/>
+                    <a:lstStyle/>
+                    <a:p>
+                      <a:r>
+                        <a:rPr lang="da-DK" dirty="0"/>
+                        <a:t>0.9989123341309549</a:t>
+                      </a:r>
+                    </a:p>
+                  </a:txBody>
+                  <a:tcPr/>
+                </a:tc>
+                <a:extLst>
+                  <a:ext uri="{0D108BD9-81ED-4DB2-BD59-A6C34878D82A}">
+                    <a16:rowId xmlns:a16="http://schemas.microsoft.com/office/drawing/2014/main" val="479782288"/>
+                  </a:ext>
+                </a:extLst>
+              </a:tr>
+              <a:tr h="370840">
+                <a:tc>
+                  <a:txBody>
+                    <a:bodyPr/>
+                    <a:lstStyle/>
+                    <a:p>
+                      <a:r>
+                        <a:rPr lang="da-DK" dirty="0"/>
+                        <a:t>Gaussian Naive Bayes</a:t>
+                      </a:r>
+                    </a:p>
+                  </a:txBody>
+                  <a:tcPr/>
+                </a:tc>
+                <a:tc>
+                  <a:txBody>
+                    <a:bodyPr/>
+                    <a:lstStyle/>
+                    <a:p>
+                      <a:r>
+                        <a:rPr lang="da-DK" dirty="0"/>
+                        <a:t>0.9283652111151209</a:t>
+                      </a:r>
+                    </a:p>
+                  </a:txBody>
+                  <a:tcPr/>
+                </a:tc>
+                <a:tc>
+                  <a:txBody>
+                    <a:bodyPr/>
+                    <a:lstStyle/>
+                    <a:p>
+                      <a:r>
+                        <a:rPr lang="da-DK" dirty="0"/>
+                        <a:t>0.9517076354144007</a:t>
+                      </a:r>
+                    </a:p>
+                  </a:txBody>
+                  <a:tcPr/>
+                </a:tc>
+                <a:extLst>
+                  <a:ext uri="{0D108BD9-81ED-4DB2-BD59-A6C34878D82A}">
+                    <a16:rowId xmlns:a16="http://schemas.microsoft.com/office/drawing/2014/main" val="827192436"/>
+                  </a:ext>
+                </a:extLst>
+              </a:tr>
+              <a:tr h="370840">
+                <a:tc>
+                  <a:txBody>
+                    <a:bodyPr/>
+                    <a:lstStyle/>
+                    <a:p>
+                      <a:r>
+                        <a:rPr lang="da-DK" dirty="0"/>
+                        <a:t>Decision Tree Classifier</a:t>
+                      </a:r>
+                    </a:p>
+                  </a:txBody>
+                  <a:tcPr/>
+                </a:tc>
+                <a:tc>
+                  <a:txBody>
+                    <a:bodyPr/>
+                    <a:lstStyle/>
+                    <a:p>
+                      <a:r>
+                        <a:rPr lang="da-DK" dirty="0"/>
+                        <a:t>0.9009382894261999</a:t>
+                      </a:r>
+                    </a:p>
+                  </a:txBody>
+                  <a:tcPr/>
+                </a:tc>
+                <a:tc>
+                  <a:txBody>
+                    <a:bodyPr/>
+                    <a:lstStyle/>
+                    <a:p>
+                      <a:r>
+                        <a:rPr lang="da-DK" dirty="0"/>
+                        <a:t>0.9899934740047858</a:t>
+                      </a:r>
+                    </a:p>
+                  </a:txBody>
+                  <a:tcPr/>
+                </a:tc>
+                <a:extLst>
+                  <a:ext uri="{0D108BD9-81ED-4DB2-BD59-A6C34878D82A}">
+                    <a16:rowId xmlns:a16="http://schemas.microsoft.com/office/drawing/2014/main" val="3877032772"/>
+                  </a:ext>
+                </a:extLst>
+              </a:tr>
+              <a:tr h="370840">
+                <a:tc>
+                  <a:txBody>
+                    <a:bodyPr/>
+                    <a:lstStyle/>
+                    <a:p>
+                      <a:r>
+                        <a:rPr lang="en-US" dirty="0"/>
+                        <a:t>Neural Network</a:t>
+                      </a:r>
+                      <a:endParaRPr lang="da-DK" dirty="0"/>
+                    </a:p>
+                  </a:txBody>
+                  <a:tcPr/>
+                </a:tc>
+                <a:tc>
+                  <a:txBody>
+                    <a:bodyPr/>
+                    <a:lstStyle/>
+                    <a:p>
+                      <a:r>
+                        <a:rPr lang="da-DK" dirty="0"/>
+                        <a:t>0.7553831348490316</a:t>
+                      </a:r>
+                    </a:p>
+                  </a:txBody>
+                  <a:tcPr/>
+                </a:tc>
+                <a:tc>
+                  <a:txBody>
+                    <a:bodyPr/>
+                    <a:lstStyle/>
+                    <a:p>
+                      <a:r>
+                        <a:rPr lang="da-DK" dirty="0"/>
+                        <a:t>0.9825973460952795</a:t>
+                      </a:r>
+                    </a:p>
+                  </a:txBody>
+                  <a:tcPr/>
+                </a:tc>
+                <a:extLst>
+                  <a:ext uri="{0D108BD9-81ED-4DB2-BD59-A6C34878D82A}">
+                    <a16:rowId xmlns:a16="http://schemas.microsoft.com/office/drawing/2014/main" val="3343300291"/>
+                  </a:ext>
+                </a:extLst>
+              </a:tr>
+            </a:tbl>
+          </a:graphicData>
+        </a:graphic>
+      </p:graphicFrame>
+    </p:spTree>
+    <p:extLst>
+      <p:ext uri="{BB962C8B-B14F-4D97-AF65-F5344CB8AC3E}">
+        <p14:creationId xmlns:p14="http://schemas.microsoft.com/office/powerpoint/2010/main" val="4136737041"/>
+      </p:ext>
+    </p:extLst>
+  </p:cSld>
+  <p:clrMapOvr>
+    <a:masterClrMapping/>
+  </p:clrMapOvr>
+</p:sld>
+</file>
+
+<file path=ppt/slides/slide12.xml><?xml version="1.0" encoding="utf-8"?>
+<p:sld xmlns:a="http://schemas.openxmlformats.org/drawingml/2006/main" xmlns:r="http://schemas.openxmlformats.org/officeDocument/2006/relationships" xmlns:p="http://schemas.openxmlformats.org/presentationml/2006/main">
+  <p:cSld>
+    <p:spTree>
+      <p:nvGrpSpPr>
+        <p:cNvPr id="1" name=""/>
+        <p:cNvGrpSpPr/>
+        <p:nvPr/>
+      </p:nvGrpSpPr>
+      <p:grpSpPr>
+        <a:xfrm>
+          <a:off x="0" y="0"/>
+          <a:ext cx="0" cy="0"/>
+          <a:chOff x="0" y="0"/>
+          <a:chExt cx="0" cy="0"/>
+        </a:xfrm>
+      </p:grpSpPr>
+      <p:sp>
+        <p:nvSpPr>
           <p:cNvPr id="2" name="Title 1">
             <a:extLst>
               <a:ext uri="{FF2B5EF4-FFF2-40B4-BE49-F238E27FC236}">
@@ -4555,7 +5026,7 @@
 </p:sld>
 </file>
 
-<file path=ppt/slides/slide12.xml><?xml version="1.0" encoding="utf-8"?>
+<file path=ppt/slides/slide13.xml><?xml version="1.0" encoding="utf-8"?>
 <p:sld xmlns:a="http://schemas.openxmlformats.org/drawingml/2006/main" xmlns:r="http://schemas.openxmlformats.org/officeDocument/2006/relationships" xmlns:p="http://schemas.openxmlformats.org/presentationml/2006/main">
   <p:cSld>
     <p:spTree>
@@ -4622,7 +5093,7 @@
           <a:bodyPr/>
           <a:lstStyle/>
           <a:p>
-            <a:endParaRPr lang="da-DK"/>
+            <a:endParaRPr lang="da-DK" dirty="0"/>
           </a:p>
         </p:txBody>
       </p:sp>
@@ -4639,7 +5110,7 @@
 </p:sld>
 </file>
 
-<file path=ppt/slides/slide13.xml><?xml version="1.0" encoding="utf-8"?>
+<file path=ppt/slides/slide14.xml><?xml version="1.0" encoding="utf-8"?>
 <p:sld xmlns:a="http://schemas.openxmlformats.org/drawingml/2006/main" xmlns:r="http://schemas.openxmlformats.org/officeDocument/2006/relationships" xmlns:p="http://schemas.openxmlformats.org/presentationml/2006/main">
   <p:cSld>
     <p:spTree>

</xml_diff>

<commit_message>
saved some more data
</commit_message>
<xml_diff>
--- a/Case/Presentation/Presentation.pptx
+++ b/Case/Presentation/Presentation.pptx
@@ -5,23 +5,25 @@
     <p:sldMasterId id="2147483648" r:id="rId1"/>
   </p:sldMasterIdLst>
   <p:notesMasterIdLst>
-    <p:notesMasterId r:id="rId16"/>
+    <p:notesMasterId r:id="rId18"/>
   </p:notesMasterIdLst>
   <p:sldIdLst>
     <p:sldId id="256" r:id="rId2"/>
     <p:sldId id="257" r:id="rId3"/>
-    <p:sldId id="259" r:id="rId4"/>
+    <p:sldId id="271" r:id="rId4"/>
     <p:sldId id="258" r:id="rId5"/>
     <p:sldId id="266" r:id="rId6"/>
     <p:sldId id="265" r:id="rId7"/>
-    <p:sldId id="261" r:id="rId8"/>
-    <p:sldId id="267" r:id="rId9"/>
-    <p:sldId id="268" r:id="rId10"/>
-    <p:sldId id="262" r:id="rId11"/>
-    <p:sldId id="269" r:id="rId12"/>
-    <p:sldId id="264" r:id="rId13"/>
-    <p:sldId id="263" r:id="rId14"/>
-    <p:sldId id="260" r:id="rId15"/>
+    <p:sldId id="270" r:id="rId8"/>
+    <p:sldId id="261" r:id="rId9"/>
+    <p:sldId id="267" r:id="rId10"/>
+    <p:sldId id="268" r:id="rId11"/>
+    <p:sldId id="262" r:id="rId12"/>
+    <p:sldId id="269" r:id="rId13"/>
+    <p:sldId id="264" r:id="rId14"/>
+    <p:sldId id="272" r:id="rId15"/>
+    <p:sldId id="263" r:id="rId16"/>
+    <p:sldId id="260" r:id="rId17"/>
   </p:sldIdLst>
   <p:sldSz cx="12192000" cy="6858000"/>
   <p:notesSz cx="6858000" cy="9144000"/>
@@ -740,6 +742,242 @@
     <p:extLst>
       <p:ext uri="{BB962C8B-B14F-4D97-AF65-F5344CB8AC3E}">
         <p14:creationId xmlns:p14="http://schemas.microsoft.com/office/powerpoint/2010/main" val="1600370962"/>
+      </p:ext>
+    </p:extLst>
+  </p:cSld>
+  <p:clrMapOvr>
+    <a:masterClrMapping/>
+  </p:clrMapOvr>
+</p:notes>
+</file>
+
+<file path=ppt/notesSlides/notesSlide3.xml><?xml version="1.0" encoding="utf-8"?>
+<p:notes xmlns:a="http://schemas.openxmlformats.org/drawingml/2006/main" xmlns:r="http://schemas.openxmlformats.org/officeDocument/2006/relationships" xmlns:p="http://schemas.openxmlformats.org/presentationml/2006/main">
+  <p:cSld>
+    <p:spTree>
+      <p:nvGrpSpPr>
+        <p:cNvPr id="1" name=""/>
+        <p:cNvGrpSpPr/>
+        <p:nvPr/>
+      </p:nvGrpSpPr>
+      <p:grpSpPr>
+        <a:xfrm>
+          <a:off x="0" y="0"/>
+          <a:ext cx="0" cy="0"/>
+          <a:chOff x="0" y="0"/>
+          <a:chExt cx="0" cy="0"/>
+        </a:xfrm>
+      </p:grpSpPr>
+      <p:sp>
+        <p:nvSpPr>
+          <p:cNvPr id="2" name="Slide Image Placeholder 1"/>
+          <p:cNvSpPr>
+            <a:spLocks noGrp="1" noRot="1" noChangeAspect="1"/>
+          </p:cNvSpPr>
+          <p:nvPr>
+            <p:ph type="sldImg"/>
+          </p:nvPr>
+        </p:nvSpPr>
+        <p:spPr/>
+      </p:sp>
+      <p:sp>
+        <p:nvSpPr>
+          <p:cNvPr id="3" name="Notes Placeholder 2"/>
+          <p:cNvSpPr>
+            <a:spLocks noGrp="1"/>
+          </p:cNvSpPr>
+          <p:nvPr>
+            <p:ph type="body" idx="1"/>
+          </p:nvPr>
+        </p:nvSpPr>
+        <p:spPr/>
+        <p:txBody>
+          <a:bodyPr/>
+          <a:lstStyle/>
+          <a:p>
+            <a:r>
+              <a:rPr lang="en-US" dirty="0"/>
+              <a:t>One bird is missing from the test set</a:t>
+            </a:r>
+            <a:endParaRPr lang="da-DK" dirty="0"/>
+          </a:p>
+        </p:txBody>
+      </p:sp>
+      <p:sp>
+        <p:nvSpPr>
+          <p:cNvPr id="4" name="Slide Number Placeholder 3"/>
+          <p:cNvSpPr>
+            <a:spLocks noGrp="1"/>
+          </p:cNvSpPr>
+          <p:nvPr>
+            <p:ph type="sldNum" sz="quarter" idx="5"/>
+          </p:nvPr>
+        </p:nvSpPr>
+        <p:spPr/>
+        <p:txBody>
+          <a:bodyPr/>
+          <a:lstStyle/>
+          <a:p>
+            <a:fld id="{6496B8C4-B326-499A-B88E-23606EBCD16B}" type="slidenum">
+              <a:rPr lang="da-DK" smtClean="0"/>
+              <a:t>9</a:t>
+            </a:fld>
+            <a:endParaRPr lang="da-DK"/>
+          </a:p>
+        </p:txBody>
+      </p:sp>
+    </p:spTree>
+    <p:extLst>
+      <p:ext uri="{BB962C8B-B14F-4D97-AF65-F5344CB8AC3E}">
+        <p14:creationId xmlns:p14="http://schemas.microsoft.com/office/powerpoint/2010/main" val="3630087592"/>
+      </p:ext>
+    </p:extLst>
+  </p:cSld>
+  <p:clrMapOvr>
+    <a:masterClrMapping/>
+  </p:clrMapOvr>
+</p:notes>
+</file>
+
+<file path=ppt/notesSlides/notesSlide4.xml><?xml version="1.0" encoding="utf-8"?>
+<p:notes xmlns:a="http://schemas.openxmlformats.org/drawingml/2006/main" xmlns:r="http://schemas.openxmlformats.org/officeDocument/2006/relationships" xmlns:p="http://schemas.openxmlformats.org/presentationml/2006/main">
+  <p:cSld>
+    <p:spTree>
+      <p:nvGrpSpPr>
+        <p:cNvPr id="1" name=""/>
+        <p:cNvGrpSpPr/>
+        <p:nvPr/>
+      </p:nvGrpSpPr>
+      <p:grpSpPr>
+        <a:xfrm>
+          <a:off x="0" y="0"/>
+          <a:ext cx="0" cy="0"/>
+          <a:chOff x="0" y="0"/>
+          <a:chExt cx="0" cy="0"/>
+        </a:xfrm>
+      </p:grpSpPr>
+      <p:sp>
+        <p:nvSpPr>
+          <p:cNvPr id="2" name="Slide Image Placeholder 1"/>
+          <p:cNvSpPr>
+            <a:spLocks noGrp="1" noRot="1" noChangeAspect="1"/>
+          </p:cNvSpPr>
+          <p:nvPr>
+            <p:ph type="sldImg"/>
+          </p:nvPr>
+        </p:nvSpPr>
+        <p:spPr/>
+      </p:sp>
+      <p:sp>
+        <p:nvSpPr>
+          <p:cNvPr id="3" name="Notes Placeholder 2"/>
+          <p:cNvSpPr>
+            <a:spLocks noGrp="1"/>
+          </p:cNvSpPr>
+          <p:nvPr>
+            <p:ph type="body" idx="1"/>
+          </p:nvPr>
+        </p:nvSpPr>
+        <p:spPr/>
+        <p:txBody>
+          <a:bodyPr/>
+          <a:lstStyle/>
+          <a:p>
+            <a:r>
+              <a:rPr lang="en-US" dirty="0" err="1"/>
+              <a:t>En</a:t>
+            </a:r>
+            <a:r>
+              <a:rPr lang="en-US" dirty="0"/>
+              <a:t> </a:t>
+            </a:r>
+            <a:r>
+              <a:rPr lang="en-US" dirty="0" err="1"/>
+              <a:t>sydlig</a:t>
+            </a:r>
+            <a:r>
+              <a:rPr lang="en-US" dirty="0"/>
+              <a:t> </a:t>
+            </a:r>
+            <a:r>
+              <a:rPr lang="en-US" dirty="0" err="1"/>
+              <a:t>nattergal</a:t>
+            </a:r>
+            <a:r>
+              <a:rPr lang="en-US" dirty="0"/>
+              <a:t> </a:t>
+            </a:r>
+            <a:r>
+              <a:rPr lang="en-US" dirty="0" err="1"/>
+              <a:t>blev</a:t>
+            </a:r>
+            <a:r>
+              <a:rPr lang="en-US" dirty="0"/>
+              <a:t> </a:t>
+            </a:r>
+            <a:r>
+              <a:rPr lang="en-US" dirty="0" err="1"/>
+              <a:t>anset</a:t>
+            </a:r>
+            <a:r>
+              <a:rPr lang="en-US" dirty="0"/>
+              <a:t> for at </a:t>
+            </a:r>
+            <a:r>
+              <a:rPr lang="en-US" dirty="0" err="1"/>
+              <a:t>være</a:t>
+            </a:r>
+            <a:r>
+              <a:rPr lang="en-US" dirty="0"/>
+              <a:t> </a:t>
+            </a:r>
+            <a:r>
+              <a:rPr lang="en-US" dirty="0" err="1"/>
+              <a:t>en</a:t>
+            </a:r>
+            <a:r>
+              <a:rPr lang="en-US" dirty="0"/>
+              <a:t> </a:t>
+            </a:r>
+            <a:r>
+              <a:rPr lang="en-US" dirty="0" err="1"/>
+              <a:t>sølvmåge</a:t>
+            </a:r>
+            <a:r>
+              <a:rPr lang="en-US" dirty="0"/>
+              <a:t> </a:t>
+            </a:r>
+            <a:endParaRPr lang="da-DK" dirty="0"/>
+          </a:p>
+        </p:txBody>
+      </p:sp>
+      <p:sp>
+        <p:nvSpPr>
+          <p:cNvPr id="4" name="Slide Number Placeholder 3"/>
+          <p:cNvSpPr>
+            <a:spLocks noGrp="1"/>
+          </p:cNvSpPr>
+          <p:nvPr>
+            <p:ph type="sldNum" sz="quarter" idx="5"/>
+          </p:nvPr>
+        </p:nvSpPr>
+        <p:spPr/>
+        <p:txBody>
+          <a:bodyPr/>
+          <a:lstStyle/>
+          <a:p>
+            <a:fld id="{6496B8C4-B326-499A-B88E-23606EBCD16B}" type="slidenum">
+              <a:rPr lang="da-DK" smtClean="0"/>
+              <a:t>13</a:t>
+            </a:fld>
+            <a:endParaRPr lang="da-DK"/>
+          </a:p>
+        </p:txBody>
+      </p:sp>
+    </p:spTree>
+    <p:extLst>
+      <p:ext uri="{BB962C8B-B14F-4D97-AF65-F5344CB8AC3E}">
+        <p14:creationId xmlns:p14="http://schemas.microsoft.com/office/powerpoint/2010/main" val="3909085917"/>
       </p:ext>
     </p:extLst>
   </p:cSld>
@@ -4374,39 +4612,166 @@
           <p:cNvPr id="2" name="Title 1">
             <a:extLst>
               <a:ext uri="{FF2B5EF4-FFF2-40B4-BE49-F238E27FC236}">
-                <a16:creationId xmlns:a16="http://schemas.microsoft.com/office/drawing/2014/main" id="{C3EDF304-43A0-D039-B84C-5AEDCBB2CFBF}"/>
-              </a:ext>
-            </a:extLst>
-          </p:cNvPr>
-          <p:cNvSpPr>
-            <a:spLocks noGrp="1"/>
-          </p:cNvSpPr>
-          <p:nvPr>
-            <p:ph type="title" idx="4294967295"/>
-          </p:nvPr>
-        </p:nvSpPr>
+                <a16:creationId xmlns:a16="http://schemas.microsoft.com/office/drawing/2014/main" id="{18BE47AF-DB62-A43E-9FA8-93130480FC1B}"/>
+              </a:ext>
+            </a:extLst>
+          </p:cNvPr>
+          <p:cNvSpPr>
+            <a:spLocks noGrp="1"/>
+          </p:cNvSpPr>
+          <p:nvPr>
+            <p:ph type="title"/>
+          </p:nvPr>
+        </p:nvSpPr>
+        <p:spPr/>
+        <p:txBody>
+          <a:bodyPr/>
+          <a:lstStyle/>
+          <a:p>
+            <a:r>
+              <a:rPr lang="en-US" dirty="0" err="1"/>
+              <a:t>Egen</a:t>
+            </a:r>
+            <a:r>
+              <a:rPr lang="en-US" dirty="0"/>
+              <a:t> data</a:t>
+            </a:r>
+            <a:endParaRPr lang="da-DK" dirty="0"/>
+          </a:p>
+        </p:txBody>
+      </p:sp>
+      <p:sp>
+        <p:nvSpPr>
+          <p:cNvPr id="3" name="Text Placeholder 2">
+            <a:extLst>
+              <a:ext uri="{FF2B5EF4-FFF2-40B4-BE49-F238E27FC236}">
+                <a16:creationId xmlns:a16="http://schemas.microsoft.com/office/drawing/2014/main" id="{38C8F29B-7D00-5B52-8882-6738495519C7}"/>
+              </a:ext>
+            </a:extLst>
+          </p:cNvPr>
+          <p:cNvSpPr>
+            <a:spLocks noGrp="1"/>
+          </p:cNvSpPr>
+          <p:nvPr>
+            <p:ph type="body" idx="1"/>
+          </p:nvPr>
+        </p:nvSpPr>
+        <p:spPr/>
+        <p:txBody>
+          <a:bodyPr/>
+          <a:lstStyle/>
+          <a:p>
+            <a:r>
+              <a:rPr lang="en-US" dirty="0"/>
+              <a:t>Test</a:t>
+            </a:r>
+            <a:endParaRPr lang="da-DK" dirty="0"/>
+          </a:p>
+        </p:txBody>
+      </p:sp>
+      <p:pic>
+        <p:nvPicPr>
+          <p:cNvPr id="8" name="Content Placeholder 7" descr="A picture containing chart&#10;&#10;Description automatically generated">
+            <a:extLst>
+              <a:ext uri="{FF2B5EF4-FFF2-40B4-BE49-F238E27FC236}">
+                <a16:creationId xmlns:a16="http://schemas.microsoft.com/office/drawing/2014/main" id="{279CACC2-1F1E-6D91-267E-5F2119C4E4F5}"/>
+              </a:ext>
+            </a:extLst>
+          </p:cNvPr>
+          <p:cNvPicPr>
+            <a:picLocks noGrp="1" noChangeAspect="1"/>
+          </p:cNvPicPr>
+          <p:nvPr>
+            <p:ph sz="half" idx="2"/>
+          </p:nvPr>
+        </p:nvPicPr>
+        <p:blipFill>
+          <a:blip r:embed="rId2">
+            <a:extLst>
+              <a:ext uri="{28A0092B-C50C-407E-A947-70E740481C1C}">
+                <a14:useLocalDpi xmlns:a14="http://schemas.microsoft.com/office/drawing/2010/main" val="0"/>
+              </a:ext>
+            </a:extLst>
+          </a:blip>
+          <a:stretch>
+            <a:fillRect/>
+          </a:stretch>
+        </p:blipFill>
         <p:spPr>
           <a:xfrm>
-            <a:off x="0" y="365125"/>
-            <a:ext cx="10515600" cy="1325563"/>
+            <a:off x="839788" y="3057922"/>
+            <a:ext cx="5157787" cy="2578893"/>
           </a:xfrm>
         </p:spPr>
-        <p:txBody>
-          <a:bodyPr/>
-          <a:lstStyle/>
-          <a:p>
-            <a:r>
-              <a:rPr lang="en-US" dirty="0" err="1"/>
-              <a:t>Resultater</a:t>
+      </p:pic>
+      <p:sp>
+        <p:nvSpPr>
+          <p:cNvPr id="5" name="Text Placeholder 4">
+            <a:extLst>
+              <a:ext uri="{FF2B5EF4-FFF2-40B4-BE49-F238E27FC236}">
+                <a16:creationId xmlns:a16="http://schemas.microsoft.com/office/drawing/2014/main" id="{7B657FD8-78FA-C97E-0BB9-302D62C0D280}"/>
+              </a:ext>
+            </a:extLst>
+          </p:cNvPr>
+          <p:cNvSpPr>
+            <a:spLocks noGrp="1"/>
+          </p:cNvSpPr>
+          <p:nvPr>
+            <p:ph type="body" sz="quarter" idx="3"/>
+          </p:nvPr>
+        </p:nvSpPr>
+        <p:spPr/>
+        <p:txBody>
+          <a:bodyPr/>
+          <a:lstStyle/>
+          <a:p>
+            <a:r>
+              <a:rPr lang="en-US" dirty="0" err="1"/>
+              <a:t>Træn</a:t>
             </a:r>
             <a:endParaRPr lang="da-DK" dirty="0"/>
           </a:p>
         </p:txBody>
       </p:sp>
+      <p:pic>
+        <p:nvPicPr>
+          <p:cNvPr id="10" name="Content Placeholder 9" descr="A picture containing chart&#10;&#10;Description automatically generated">
+            <a:extLst>
+              <a:ext uri="{FF2B5EF4-FFF2-40B4-BE49-F238E27FC236}">
+                <a16:creationId xmlns:a16="http://schemas.microsoft.com/office/drawing/2014/main" id="{D2CADDE7-5B4A-7EC7-1687-86EAC2F33618}"/>
+              </a:ext>
+            </a:extLst>
+          </p:cNvPr>
+          <p:cNvPicPr>
+            <a:picLocks noGrp="1" noChangeAspect="1"/>
+          </p:cNvPicPr>
+          <p:nvPr>
+            <p:ph sz="quarter" idx="4"/>
+          </p:nvPr>
+        </p:nvPicPr>
+        <p:blipFill>
+          <a:blip r:embed="rId3">
+            <a:extLst>
+              <a:ext uri="{28A0092B-C50C-407E-A947-70E740481C1C}">
+                <a14:useLocalDpi xmlns:a14="http://schemas.microsoft.com/office/drawing/2010/main" val="0"/>
+              </a:ext>
+            </a:extLst>
+          </a:blip>
+          <a:stretch>
+            <a:fillRect/>
+          </a:stretch>
+        </p:blipFill>
+        <p:spPr>
+          <a:xfrm>
+            <a:off x="6172200" y="3051572"/>
+            <a:ext cx="5183188" cy="2591594"/>
+          </a:xfrm>
+        </p:spPr>
+      </p:pic>
     </p:spTree>
     <p:extLst>
       <p:ext uri="{BB962C8B-B14F-4D97-AF65-F5344CB8AC3E}">
-        <p14:creationId xmlns:p14="http://schemas.microsoft.com/office/powerpoint/2010/main" val="1302728710"/>
+        <p14:creationId xmlns:p14="http://schemas.microsoft.com/office/powerpoint/2010/main" val="2848564023"/>
       </p:ext>
     </p:extLst>
   </p:cSld>
@@ -4435,6 +4800,71 @@
       </p:grpSpPr>
       <p:sp>
         <p:nvSpPr>
+          <p:cNvPr id="2" name="Title 1">
+            <a:extLst>
+              <a:ext uri="{FF2B5EF4-FFF2-40B4-BE49-F238E27FC236}">
+                <a16:creationId xmlns:a16="http://schemas.microsoft.com/office/drawing/2014/main" id="{C3EDF304-43A0-D039-B84C-5AEDCBB2CFBF}"/>
+              </a:ext>
+            </a:extLst>
+          </p:cNvPr>
+          <p:cNvSpPr>
+            <a:spLocks noGrp="1"/>
+          </p:cNvSpPr>
+          <p:nvPr>
+            <p:ph type="title"/>
+          </p:nvPr>
+        </p:nvSpPr>
+        <p:spPr>
+          <a:xfrm>
+            <a:off x="741219" y="2766218"/>
+            <a:ext cx="10515600" cy="1325563"/>
+          </a:xfrm>
+        </p:spPr>
+        <p:txBody>
+          <a:bodyPr/>
+          <a:lstStyle/>
+          <a:p>
+            <a:pPr algn="ctr"/>
+            <a:r>
+              <a:rPr lang="en-US" dirty="0" err="1"/>
+              <a:t>Resultater</a:t>
+            </a:r>
+            <a:endParaRPr lang="da-DK" dirty="0"/>
+          </a:p>
+        </p:txBody>
+      </p:sp>
+    </p:spTree>
+    <p:extLst>
+      <p:ext uri="{BB962C8B-B14F-4D97-AF65-F5344CB8AC3E}">
+        <p14:creationId xmlns:p14="http://schemas.microsoft.com/office/powerpoint/2010/main" val="1302728710"/>
+      </p:ext>
+    </p:extLst>
+  </p:cSld>
+  <p:clrMapOvr>
+    <a:masterClrMapping/>
+  </p:clrMapOvr>
+</p:sld>
+</file>
+
+<file path=ppt/slides/slide12.xml><?xml version="1.0" encoding="utf-8"?>
+<p:sld xmlns:a="http://schemas.openxmlformats.org/drawingml/2006/main" xmlns:r="http://schemas.openxmlformats.org/officeDocument/2006/relationships" xmlns:p="http://schemas.openxmlformats.org/presentationml/2006/main">
+  <p:cSld>
+    <p:spTree>
+      <p:nvGrpSpPr>
+        <p:cNvPr id="1" name=""/>
+        <p:cNvGrpSpPr/>
+        <p:nvPr/>
+      </p:nvGrpSpPr>
+      <p:grpSpPr>
+        <a:xfrm>
+          <a:off x="0" y="0"/>
+          <a:ext cx="0" cy="0"/>
+          <a:chOff x="0" y="0"/>
+          <a:chExt cx="0" cy="0"/>
+        </a:xfrm>
+      </p:grpSpPr>
+      <p:sp>
+        <p:nvSpPr>
           <p:cNvPr id="4" name="Title 3">
             <a:extLst>
               <a:ext uri="{FF2B5EF4-FFF2-40B4-BE49-F238E27FC236}">
@@ -4455,14 +4885,17 @@
           <a:lstStyle/>
           <a:p>
             <a:r>
-              <a:rPr lang="en-US" dirty="0"/>
-              <a:t>Results – </a:t>
-            </a:r>
-            <a:r>
-              <a:rPr lang="en-US" dirty="0" err="1"/>
+              <a:rPr lang="en-US" dirty="0" err="1"/>
+              <a:t>Resulter</a:t>
+            </a:r>
+            <a:r>
+              <a:rPr lang="en-US" dirty="0"/>
+              <a:t> – </a:t>
+            </a:r>
+            <a:r>
+              <a:rPr lang="da-DK" dirty="0"/>
               <a:t>Præsision</a:t>
             </a:r>
-            <a:endParaRPr lang="da-DK" dirty="0"/>
           </a:p>
         </p:txBody>
       </p:sp>
@@ -4906,126 +5339,6 @@
 </p:sld>
 </file>
 
-<file path=ppt/slides/slide12.xml><?xml version="1.0" encoding="utf-8"?>
-<p:sld xmlns:a="http://schemas.openxmlformats.org/drawingml/2006/main" xmlns:r="http://schemas.openxmlformats.org/officeDocument/2006/relationships" xmlns:p="http://schemas.openxmlformats.org/presentationml/2006/main">
-  <p:cSld>
-    <p:spTree>
-      <p:nvGrpSpPr>
-        <p:cNvPr id="1" name=""/>
-        <p:cNvGrpSpPr/>
-        <p:nvPr/>
-      </p:nvGrpSpPr>
-      <p:grpSpPr>
-        <a:xfrm>
-          <a:off x="0" y="0"/>
-          <a:ext cx="0" cy="0"/>
-          <a:chOff x="0" y="0"/>
-          <a:chExt cx="0" cy="0"/>
-        </a:xfrm>
-      </p:grpSpPr>
-      <p:sp>
-        <p:nvSpPr>
-          <p:cNvPr id="2" name="Title 1">
-            <a:extLst>
-              <a:ext uri="{FF2B5EF4-FFF2-40B4-BE49-F238E27FC236}">
-                <a16:creationId xmlns:a16="http://schemas.microsoft.com/office/drawing/2014/main" id="{BC9BCD3F-5B19-99BD-EBBA-DBF5B11C30C3}"/>
-              </a:ext>
-            </a:extLst>
-          </p:cNvPr>
-          <p:cNvSpPr>
-            <a:spLocks noGrp="1"/>
-          </p:cNvSpPr>
-          <p:nvPr>
-            <p:ph type="title"/>
-          </p:nvPr>
-        </p:nvSpPr>
-        <p:spPr/>
-        <p:txBody>
-          <a:bodyPr/>
-          <a:lstStyle/>
-          <a:p>
-            <a:r>
-              <a:rPr lang="en-US" dirty="0" err="1"/>
-              <a:t>Resultater</a:t>
-            </a:r>
-            <a:endParaRPr lang="da-DK" dirty="0"/>
-          </a:p>
-        </p:txBody>
-      </p:sp>
-      <p:sp>
-        <p:nvSpPr>
-          <p:cNvPr id="3" name="Content Placeholder 2">
-            <a:extLst>
-              <a:ext uri="{FF2B5EF4-FFF2-40B4-BE49-F238E27FC236}">
-                <a16:creationId xmlns:a16="http://schemas.microsoft.com/office/drawing/2014/main" id="{3DE0D9A5-0DFE-B3BE-7033-A5074B70B86E}"/>
-              </a:ext>
-            </a:extLst>
-          </p:cNvPr>
-          <p:cNvSpPr>
-            <a:spLocks noGrp="1"/>
-          </p:cNvSpPr>
-          <p:nvPr>
-            <p:ph idx="1"/>
-          </p:nvPr>
-        </p:nvSpPr>
-        <p:spPr/>
-        <p:txBody>
-          <a:bodyPr/>
-          <a:lstStyle/>
-          <a:p>
-            <a:endParaRPr lang="da-DK"/>
-          </a:p>
-        </p:txBody>
-      </p:sp>
-      <p:pic>
-        <p:nvPicPr>
-          <p:cNvPr id="6" name="Content Placeholder 4" descr="A picture containing graphical user interface&#10;&#10;Description automatically generated">
-            <a:extLst>
-              <a:ext uri="{FF2B5EF4-FFF2-40B4-BE49-F238E27FC236}">
-                <a16:creationId xmlns:a16="http://schemas.microsoft.com/office/drawing/2014/main" id="{181F725D-F943-06E6-8395-F296A6778965}"/>
-              </a:ext>
-            </a:extLst>
-          </p:cNvPr>
-          <p:cNvPicPr>
-            <a:picLocks noChangeAspect="1"/>
-          </p:cNvPicPr>
-          <p:nvPr/>
-        </p:nvPicPr>
-        <p:blipFill>
-          <a:blip r:embed="rId2">
-            <a:extLst>
-              <a:ext uri="{28A0092B-C50C-407E-A947-70E740481C1C}">
-                <a14:useLocalDpi xmlns:a14="http://schemas.microsoft.com/office/drawing/2010/main" val="0"/>
-              </a:ext>
-            </a:extLst>
-          </a:blip>
-          <a:stretch>
-            <a:fillRect/>
-          </a:stretch>
-        </p:blipFill>
-        <p:spPr>
-          <a:xfrm>
-            <a:off x="1811606" y="1825625"/>
-            <a:ext cx="8568788" cy="4351338"/>
-          </a:xfrm>
-          <a:prstGeom prst="rect">
-            <a:avLst/>
-          </a:prstGeom>
-        </p:spPr>
-      </p:pic>
-    </p:spTree>
-    <p:extLst>
-      <p:ext uri="{BB962C8B-B14F-4D97-AF65-F5344CB8AC3E}">
-        <p14:creationId xmlns:p14="http://schemas.microsoft.com/office/powerpoint/2010/main" val="369592505"/>
-      </p:ext>
-    </p:extLst>
-  </p:cSld>
-  <p:clrMapOvr>
-    <a:masterClrMapping/>
-  </p:clrMapOvr>
-</p:sld>
-</file>
-
 <file path=ppt/slides/slide13.xml><?xml version="1.0" encoding="utf-8"?>
 <p:sld xmlns:a="http://schemas.openxmlformats.org/drawingml/2006/main" xmlns:r="http://schemas.openxmlformats.org/officeDocument/2006/relationships" xmlns:p="http://schemas.openxmlformats.org/presentationml/2006/main">
   <p:cSld>
@@ -5043,11 +5356,171 @@
           <a:chExt cx="0" cy="0"/>
         </a:xfrm>
       </p:grpSpPr>
+      <p:pic>
+        <p:nvPicPr>
+          <p:cNvPr id="6" name="Content Placeholder 4" descr="A picture containing graphical user interface&#10;&#10;Description automatically generated">
+            <a:extLst>
+              <a:ext uri="{FF2B5EF4-FFF2-40B4-BE49-F238E27FC236}">
+                <a16:creationId xmlns:a16="http://schemas.microsoft.com/office/drawing/2014/main" id="{181F725D-F943-06E6-8395-F296A6778965}"/>
+              </a:ext>
+            </a:extLst>
+          </p:cNvPr>
+          <p:cNvPicPr>
+            <a:picLocks noChangeAspect="1"/>
+          </p:cNvPicPr>
+          <p:nvPr/>
+        </p:nvPicPr>
+        <p:blipFill>
+          <a:blip r:embed="rId3">
+            <a:extLst>
+              <a:ext uri="{28A0092B-C50C-407E-A947-70E740481C1C}">
+                <a14:useLocalDpi xmlns:a14="http://schemas.microsoft.com/office/drawing/2010/main" val="0"/>
+              </a:ext>
+            </a:extLst>
+          </a:blip>
+          <a:stretch>
+            <a:fillRect/>
+          </a:stretch>
+        </p:blipFill>
+        <p:spPr>
+          <a:xfrm>
+            <a:off x="392903" y="1108365"/>
+            <a:ext cx="11399942" cy="5789032"/>
+          </a:xfrm>
+          <a:prstGeom prst="rect">
+            <a:avLst/>
+          </a:prstGeom>
+        </p:spPr>
+      </p:pic>
       <p:sp>
         <p:nvSpPr>
           <p:cNvPr id="2" name="Title 1">
             <a:extLst>
               <a:ext uri="{FF2B5EF4-FFF2-40B4-BE49-F238E27FC236}">
+                <a16:creationId xmlns:a16="http://schemas.microsoft.com/office/drawing/2014/main" id="{BC9BCD3F-5B19-99BD-EBBA-DBF5B11C30C3}"/>
+              </a:ext>
+            </a:extLst>
+          </p:cNvPr>
+          <p:cNvSpPr>
+            <a:spLocks noGrp="1"/>
+          </p:cNvSpPr>
+          <p:nvPr>
+            <p:ph type="title"/>
+          </p:nvPr>
+        </p:nvSpPr>
+        <p:spPr/>
+        <p:txBody>
+          <a:bodyPr/>
+          <a:lstStyle/>
+          <a:p>
+            <a:r>
+              <a:rPr lang="en-US" dirty="0" err="1"/>
+              <a:t>Resultater</a:t>
+            </a:r>
+            <a:endParaRPr lang="da-DK" dirty="0"/>
+          </a:p>
+        </p:txBody>
+      </p:sp>
+    </p:spTree>
+    <p:extLst>
+      <p:ext uri="{BB962C8B-B14F-4D97-AF65-F5344CB8AC3E}">
+        <p14:creationId xmlns:p14="http://schemas.microsoft.com/office/powerpoint/2010/main" val="369592505"/>
+      </p:ext>
+    </p:extLst>
+  </p:cSld>
+  <p:clrMapOvr>
+    <a:masterClrMapping/>
+  </p:clrMapOvr>
+</p:sld>
+</file>
+
+<file path=ppt/slides/slide14.xml><?xml version="1.0" encoding="utf-8"?>
+<p:sld xmlns:a="http://schemas.openxmlformats.org/drawingml/2006/main" xmlns:r="http://schemas.openxmlformats.org/officeDocument/2006/relationships" xmlns:p="http://schemas.openxmlformats.org/presentationml/2006/main">
+  <p:cSld>
+    <p:spTree>
+      <p:nvGrpSpPr>
+        <p:cNvPr id="1" name=""/>
+        <p:cNvGrpSpPr/>
+        <p:nvPr/>
+      </p:nvGrpSpPr>
+      <p:grpSpPr>
+        <a:xfrm>
+          <a:off x="0" y="0"/>
+          <a:ext cx="0" cy="0"/>
+          <a:chOff x="0" y="0"/>
+          <a:chExt cx="0" cy="0"/>
+        </a:xfrm>
+      </p:grpSpPr>
+      <p:sp>
+        <p:nvSpPr>
+          <p:cNvPr id="2" name="Title 1">
+            <a:extLst>
+              <a:ext uri="{FF2B5EF4-FFF2-40B4-BE49-F238E27FC236}">
+                <a16:creationId xmlns:a16="http://schemas.microsoft.com/office/drawing/2014/main" id="{C3EDF304-43A0-D039-B84C-5AEDCBB2CFBF}"/>
+              </a:ext>
+            </a:extLst>
+          </p:cNvPr>
+          <p:cNvSpPr>
+            <a:spLocks noGrp="1"/>
+          </p:cNvSpPr>
+          <p:nvPr>
+            <p:ph type="title"/>
+          </p:nvPr>
+        </p:nvSpPr>
+        <p:spPr>
+          <a:xfrm>
+            <a:off x="741219" y="2766218"/>
+            <a:ext cx="10515600" cy="1325563"/>
+          </a:xfrm>
+        </p:spPr>
+        <p:txBody>
+          <a:bodyPr/>
+          <a:lstStyle/>
+          <a:p>
+            <a:pPr algn="ctr"/>
+            <a:r>
+              <a:rPr lang="en-US" dirty="0" err="1"/>
+              <a:t>Konklusion</a:t>
+            </a:r>
+            <a:endParaRPr lang="da-DK" dirty="0"/>
+          </a:p>
+        </p:txBody>
+      </p:sp>
+    </p:spTree>
+    <p:extLst>
+      <p:ext uri="{BB962C8B-B14F-4D97-AF65-F5344CB8AC3E}">
+        <p14:creationId xmlns:p14="http://schemas.microsoft.com/office/powerpoint/2010/main" val="4121583885"/>
+      </p:ext>
+    </p:extLst>
+  </p:cSld>
+  <p:clrMapOvr>
+    <a:masterClrMapping/>
+  </p:clrMapOvr>
+</p:sld>
+</file>
+
+<file path=ppt/slides/slide15.xml><?xml version="1.0" encoding="utf-8"?>
+<p:sld xmlns:a="http://schemas.openxmlformats.org/drawingml/2006/main" xmlns:r="http://schemas.openxmlformats.org/officeDocument/2006/relationships" xmlns:p="http://schemas.openxmlformats.org/presentationml/2006/main">
+  <p:cSld>
+    <p:spTree>
+      <p:nvGrpSpPr>
+        <p:cNvPr id="1" name=""/>
+        <p:cNvGrpSpPr/>
+        <p:nvPr/>
+      </p:nvGrpSpPr>
+      <p:grpSpPr>
+        <a:xfrm>
+          <a:off x="0" y="0"/>
+          <a:ext cx="0" cy="0"/>
+          <a:chOff x="0" y="0"/>
+          <a:chExt cx="0" cy="0"/>
+        </a:xfrm>
+      </p:grpSpPr>
+      <p:sp>
+        <p:nvSpPr>
+          <p:cNvPr id="2" name="Title 1">
+            <a:extLst>
+              <a:ext uri="{FF2B5EF4-FFF2-40B4-BE49-F238E27FC236}">
                 <a16:creationId xmlns:a16="http://schemas.microsoft.com/office/drawing/2014/main" id="{17253F37-DB4F-209D-B6BB-8177972FD21B}"/>
               </a:ext>
             </a:extLst>
@@ -5092,6 +5565,153 @@
         <p:txBody>
           <a:bodyPr/>
           <a:lstStyle/>
+          <a:p>
+            <a:r>
+              <a:rPr lang="en-US" dirty="0" err="1"/>
+              <a:t>Eget</a:t>
+            </a:r>
+            <a:r>
+              <a:rPr lang="en-US" dirty="0"/>
+              <a:t> </a:t>
+            </a:r>
+            <a:r>
+              <a:rPr lang="en-US" dirty="0" err="1"/>
+              <a:t>opdelt</a:t>
+            </a:r>
+            <a:r>
+              <a:rPr lang="en-US" dirty="0"/>
+              <a:t> data er </a:t>
+            </a:r>
+            <a:r>
+              <a:rPr lang="en-US" dirty="0" err="1"/>
+              <a:t>mest</a:t>
+            </a:r>
+            <a:r>
+              <a:rPr lang="en-US" dirty="0"/>
+              <a:t> </a:t>
+            </a:r>
+            <a:r>
+              <a:rPr lang="en-US" dirty="0" err="1"/>
+              <a:t>præsis</a:t>
+            </a:r>
+            <a:r>
+              <a:rPr lang="en-US" dirty="0"/>
+              <a:t>. </a:t>
+            </a:r>
+          </a:p>
+          <a:p>
+            <a:r>
+              <a:rPr lang="en-US" dirty="0" err="1"/>
+              <a:t>Pga</a:t>
+            </a:r>
+            <a:r>
+              <a:rPr lang="en-US" dirty="0"/>
+              <a:t>. data </a:t>
+            </a:r>
+            <a:r>
+              <a:rPr lang="en-US" dirty="0" err="1"/>
+              <a:t>opdeling</a:t>
+            </a:r>
+            <a:r>
+              <a:rPr lang="en-US" dirty="0"/>
+              <a:t> </a:t>
+            </a:r>
+            <a:r>
+              <a:rPr lang="en-US" dirty="0" err="1"/>
+              <a:t>vil</a:t>
+            </a:r>
+            <a:r>
+              <a:rPr lang="en-US" dirty="0"/>
+              <a:t> den </a:t>
+            </a:r>
+            <a:r>
+              <a:rPr lang="en-US" dirty="0" err="1"/>
+              <a:t>være</a:t>
+            </a:r>
+            <a:r>
+              <a:rPr lang="en-US" dirty="0"/>
+              <a:t> </a:t>
+            </a:r>
+            <a:r>
+              <a:rPr lang="en-US" dirty="0" err="1"/>
+              <a:t>bedre</a:t>
+            </a:r>
+            <a:r>
+              <a:rPr lang="en-US" dirty="0"/>
+              <a:t> </a:t>
+            </a:r>
+            <a:r>
+              <a:rPr lang="en-US" dirty="0" err="1"/>
+              <a:t>til</a:t>
+            </a:r>
+            <a:r>
+              <a:rPr lang="en-US" dirty="0"/>
+              <a:t> at </a:t>
+            </a:r>
+            <a:r>
+              <a:rPr lang="en-US" dirty="0" err="1"/>
+              <a:t>genkende</a:t>
+            </a:r>
+            <a:r>
+              <a:rPr lang="en-US" dirty="0"/>
+              <a:t> </a:t>
+            </a:r>
+            <a:r>
+              <a:rPr lang="en-US" dirty="0" err="1"/>
+              <a:t>bestemte</a:t>
+            </a:r>
+            <a:r>
+              <a:rPr lang="en-US" dirty="0"/>
+              <a:t> fugle</a:t>
+            </a:r>
+          </a:p>
+          <a:p>
+            <a:pPr lvl="1"/>
+            <a:r>
+              <a:rPr lang="en-US" dirty="0"/>
+              <a:t>Disse fugle er der </a:t>
+            </a:r>
+            <a:r>
+              <a:rPr lang="en-US" dirty="0" err="1"/>
+              <a:t>også</a:t>
+            </a:r>
+            <a:r>
+              <a:rPr lang="en-US" dirty="0"/>
+              <a:t> </a:t>
+            </a:r>
+            <a:r>
+              <a:rPr lang="en-US" dirty="0" err="1"/>
+              <a:t>flere</a:t>
+            </a:r>
+            <a:r>
+              <a:rPr lang="en-US" dirty="0"/>
+              <a:t> </a:t>
+            </a:r>
+            <a:r>
+              <a:rPr lang="en-US" dirty="0" err="1"/>
+              <a:t>af</a:t>
+            </a:r>
+            <a:r>
+              <a:rPr lang="en-US" dirty="0"/>
+              <a:t> </a:t>
+            </a:r>
+            <a:r>
+              <a:rPr lang="en-US" dirty="0" err="1"/>
+              <a:t>i</a:t>
+            </a:r>
+            <a:r>
+              <a:rPr lang="en-US" dirty="0"/>
+              <a:t> test </a:t>
+            </a:r>
+            <a:r>
+              <a:rPr lang="en-US" dirty="0" err="1"/>
+              <a:t>data’en</a:t>
+            </a:r>
+            <a:r>
+              <a:rPr lang="en-US" dirty="0"/>
+              <a:t>.</a:t>
+            </a:r>
+          </a:p>
           <a:p>
             <a:endParaRPr lang="da-DK" dirty="0"/>
           </a:p>
@@ -5110,7 +5730,7 @@
 </p:sld>
 </file>
 
-<file path=ppt/slides/slide14.xml><?xml version="1.0" encoding="utf-8"?>
+<file path=ppt/slides/slide16.xml><?xml version="1.0" encoding="utf-8"?>
 <p:sld xmlns:a="http://schemas.openxmlformats.org/drawingml/2006/main" xmlns:r="http://schemas.openxmlformats.org/officeDocument/2006/relationships" xmlns:p="http://schemas.openxmlformats.org/presentationml/2006/main">
   <p:cSld>
     <p:spTree>
@@ -5285,7 +5905,7 @@
             <a:spLocks noGrp="1"/>
           </p:cNvSpPr>
           <p:nvPr>
-            <p:ph idx="1"/>
+            <p:ph sz="half" idx="1"/>
           </p:nvPr>
         </p:nvSpPr>
         <p:spPr/>
@@ -5361,6 +5981,71 @@
               <a:t>Konkusion</a:t>
             </a:r>
             <a:endParaRPr lang="en-US" dirty="0"/>
+          </a:p>
+          <a:p>
+            <a:endParaRPr lang="da-DK" dirty="0"/>
+          </a:p>
+        </p:txBody>
+      </p:sp>
+      <p:sp>
+        <p:nvSpPr>
+          <p:cNvPr id="7" name="Content Placeholder 6">
+            <a:extLst>
+              <a:ext uri="{FF2B5EF4-FFF2-40B4-BE49-F238E27FC236}">
+                <a16:creationId xmlns:a16="http://schemas.microsoft.com/office/drawing/2014/main" id="{41EEB288-E097-2A6B-5981-DFA2054911C5}"/>
+              </a:ext>
+            </a:extLst>
+          </p:cNvPr>
+          <p:cNvSpPr>
+            <a:spLocks noGrp="1"/>
+          </p:cNvSpPr>
+          <p:nvPr>
+            <p:ph sz="half" idx="2"/>
+          </p:nvPr>
+        </p:nvSpPr>
+        <p:spPr/>
+        <p:txBody>
+          <a:bodyPr>
+            <a:normAutofit lnSpcReduction="10000"/>
+          </a:bodyPr>
+          <a:lstStyle/>
+          <a:p>
+            <a:pPr marL="0" indent="0">
+              <a:buNone/>
+            </a:pPr>
+            <a:r>
+              <a:rPr lang="en-US" dirty="0" err="1"/>
+              <a:t>Formål</a:t>
+            </a:r>
+            <a:endParaRPr lang="en-US" dirty="0"/>
+          </a:p>
+          <a:p>
+            <a:r>
+              <a:rPr lang="en-US" dirty="0" err="1"/>
+              <a:t>Genkendelse</a:t>
+            </a:r>
+            <a:r>
+              <a:rPr lang="en-US" dirty="0"/>
+              <a:t> </a:t>
+            </a:r>
+            <a:r>
+              <a:rPr lang="en-US" dirty="0" err="1"/>
+              <a:t>af</a:t>
+            </a:r>
+            <a:r>
+              <a:rPr lang="en-US" dirty="0"/>
+              <a:t> fugle </a:t>
+            </a:r>
+          </a:p>
+          <a:p>
+            <a:r>
+              <a:rPr lang="en-US" dirty="0" err="1"/>
+              <a:t>Numeriske</a:t>
+            </a:r>
+            <a:r>
+              <a:rPr lang="en-US" dirty="0"/>
+              <a:t> data</a:t>
+            </a:r>
           </a:p>
           <a:p>
             <a:endParaRPr lang="da-DK" dirty="0"/>
@@ -5402,7 +6087,7 @@
           <p:cNvPr id="2" name="Title 1">
             <a:extLst>
               <a:ext uri="{FF2B5EF4-FFF2-40B4-BE49-F238E27FC236}">
-                <a16:creationId xmlns:a16="http://schemas.microsoft.com/office/drawing/2014/main" id="{6B0BBF1F-482B-2664-AA50-9A31F5984804}"/>
+                <a16:creationId xmlns:a16="http://schemas.microsoft.com/office/drawing/2014/main" id="{C3EDF304-43A0-D039-B84C-5AEDCBB2CFBF}"/>
               </a:ext>
             </a:extLst>
           </p:cNvPr>
@@ -5413,76 +6098,29 @@
             <p:ph type="title"/>
           </p:nvPr>
         </p:nvSpPr>
-        <p:spPr/>
-        <p:txBody>
-          <a:bodyPr/>
-          <a:lstStyle/>
-          <a:p>
-            <a:r>
-              <a:rPr lang="en-US" dirty="0" err="1"/>
-              <a:t>Formål</a:t>
+        <p:spPr>
+          <a:xfrm>
+            <a:off x="741219" y="2766218"/>
+            <a:ext cx="10515600" cy="1325563"/>
+          </a:xfrm>
+        </p:spPr>
+        <p:txBody>
+          <a:bodyPr/>
+          <a:lstStyle/>
+          <a:p>
+            <a:pPr algn="ctr"/>
+            <a:r>
+              <a:rPr lang="en-US" dirty="0" err="1"/>
+              <a:t>Datasæts</a:t>
             </a:r>
             <a:endParaRPr lang="da-DK" dirty="0"/>
-          </a:p>
-        </p:txBody>
-      </p:sp>
-      <p:sp>
-        <p:nvSpPr>
-          <p:cNvPr id="3" name="Content Placeholder 2">
-            <a:extLst>
-              <a:ext uri="{FF2B5EF4-FFF2-40B4-BE49-F238E27FC236}">
-                <a16:creationId xmlns:a16="http://schemas.microsoft.com/office/drawing/2014/main" id="{882245C2-0245-4363-B443-91DEBD4E49CB}"/>
-              </a:ext>
-            </a:extLst>
-          </p:cNvPr>
-          <p:cNvSpPr>
-            <a:spLocks noGrp="1"/>
-          </p:cNvSpPr>
-          <p:nvPr>
-            <p:ph idx="1"/>
-          </p:nvPr>
-        </p:nvSpPr>
-        <p:spPr/>
-        <p:txBody>
-          <a:bodyPr/>
-          <a:lstStyle/>
-          <a:p>
-            <a:r>
-              <a:rPr lang="en-US" dirty="0" err="1"/>
-              <a:t>Genkendelse</a:t>
-            </a:r>
-            <a:r>
-              <a:rPr lang="en-US" dirty="0"/>
-              <a:t> </a:t>
-            </a:r>
-            <a:r>
-              <a:rPr lang="en-US" dirty="0" err="1"/>
-              <a:t>af</a:t>
-            </a:r>
-            <a:r>
-              <a:rPr lang="en-US" dirty="0"/>
-              <a:t> fugle </a:t>
-            </a:r>
-          </a:p>
-          <a:p>
-            <a:r>
-              <a:rPr lang="en-US" dirty="0" err="1"/>
-              <a:t>Numeriske</a:t>
-            </a:r>
-            <a:r>
-              <a:rPr lang="en-US" dirty="0"/>
-              <a:t> data</a:t>
-            </a:r>
-          </a:p>
-          <a:p>
-            <a:endParaRPr lang="en-US" dirty="0"/>
           </a:p>
         </p:txBody>
       </p:sp>
     </p:spTree>
     <p:extLst>
       <p:ext uri="{BB962C8B-B14F-4D97-AF65-F5344CB8AC3E}">
-        <p14:creationId xmlns:p14="http://schemas.microsoft.com/office/powerpoint/2010/main" val="16058101"/>
+        <p14:creationId xmlns:p14="http://schemas.microsoft.com/office/powerpoint/2010/main" val="2484733838"/>
       </p:ext>
     </p:extLst>
   </p:cSld>
@@ -6003,7 +6641,7 @@
 </file>
 
 <file path=ppt/slides/slide6.xml><?xml version="1.0" encoding="utf-8"?>
-<p:sld xmlns:a="http://schemas.openxmlformats.org/drawingml/2006/main" xmlns:r="http://schemas.openxmlformats.org/officeDocument/2006/relationships" xmlns:p="http://schemas.openxmlformats.org/presentationml/2006/main">
+<p:sld xmlns:a="http://schemas.openxmlformats.org/drawingml/2006/main" xmlns:r="http://schemas.openxmlformats.org/officeDocument/2006/relationships" xmlns:p="http://schemas.openxmlformats.org/presentationml/2006/main" show="0">
   <p:cSld>
     <p:spTree>
       <p:nvGrpSpPr>
@@ -6116,7 +6754,7 @@
           <p:cNvPr id="2" name="Title 1">
             <a:extLst>
               <a:ext uri="{FF2B5EF4-FFF2-40B4-BE49-F238E27FC236}">
-                <a16:creationId xmlns:a16="http://schemas.microsoft.com/office/drawing/2014/main" id="{7D1ED1D4-302E-48E5-4DBF-1BE26F5D624F}"/>
+                <a16:creationId xmlns:a16="http://schemas.microsoft.com/office/drawing/2014/main" id="{C3EDF304-43A0-D039-B84C-5AEDCBB2CFBF}"/>
               </a:ext>
             </a:extLst>
           </p:cNvPr>
@@ -6127,271 +6765,20 @@
             <p:ph type="title"/>
           </p:nvPr>
         </p:nvSpPr>
-        <p:spPr/>
-        <p:txBody>
-          <a:bodyPr/>
-          <a:lstStyle/>
-          <a:p>
+        <p:spPr>
+          <a:xfrm>
+            <a:off x="741219" y="2766218"/>
+            <a:ext cx="10515600" cy="1325563"/>
+          </a:xfrm>
+        </p:spPr>
+        <p:txBody>
+          <a:bodyPr/>
+          <a:lstStyle/>
+          <a:p>
+            <a:pPr algn="ctr"/>
             <a:r>
               <a:rPr lang="en-US" dirty="0"/>
               <a:t>Set-up</a:t>
-            </a:r>
-            <a:endParaRPr lang="da-DK" dirty="0"/>
-          </a:p>
-        </p:txBody>
-      </p:sp>
-      <p:sp>
-        <p:nvSpPr>
-          <p:cNvPr id="6" name="Text Placeholder 5">
-            <a:extLst>
-              <a:ext uri="{FF2B5EF4-FFF2-40B4-BE49-F238E27FC236}">
-                <a16:creationId xmlns:a16="http://schemas.microsoft.com/office/drawing/2014/main" id="{B22FAC0C-E14F-636B-3BBF-29D53FC74A56}"/>
-              </a:ext>
-            </a:extLst>
-          </p:cNvPr>
-          <p:cNvSpPr>
-            <a:spLocks noGrp="1"/>
-          </p:cNvSpPr>
-          <p:nvPr>
-            <p:ph type="body" idx="1"/>
-          </p:nvPr>
-        </p:nvSpPr>
-        <p:spPr/>
-        <p:txBody>
-          <a:bodyPr/>
-          <a:lstStyle/>
-          <a:p>
-            <a:r>
-              <a:rPr lang="en-US" dirty="0" err="1"/>
-              <a:t>Datasæts</a:t>
-            </a:r>
-            <a:endParaRPr lang="da-DK" dirty="0"/>
-          </a:p>
-        </p:txBody>
-      </p:sp>
-      <p:sp>
-        <p:nvSpPr>
-          <p:cNvPr id="4" name="Content Placeholder 3">
-            <a:extLst>
-              <a:ext uri="{FF2B5EF4-FFF2-40B4-BE49-F238E27FC236}">
-                <a16:creationId xmlns:a16="http://schemas.microsoft.com/office/drawing/2014/main" id="{2F6908E3-6783-4DE7-0F2F-A855EE823C0A}"/>
-              </a:ext>
-            </a:extLst>
-          </p:cNvPr>
-          <p:cNvSpPr>
-            <a:spLocks noGrp="1"/>
-          </p:cNvSpPr>
-          <p:nvPr>
-            <p:ph sz="half" idx="2"/>
-          </p:nvPr>
-        </p:nvSpPr>
-        <p:spPr/>
-        <p:txBody>
-          <a:bodyPr>
-            <a:normAutofit fontScale="92500" lnSpcReduction="20000"/>
-          </a:bodyPr>
-          <a:lstStyle/>
-          <a:p>
-            <a:r>
-              <a:rPr lang="en-US" dirty="0" err="1"/>
-              <a:t>Forfatterens</a:t>
-            </a:r>
-            <a:r>
-              <a:rPr lang="en-US" dirty="0"/>
-              <a:t> </a:t>
-            </a:r>
-            <a:r>
-              <a:rPr lang="en-US" dirty="0" err="1"/>
-              <a:t>egen</a:t>
-            </a:r>
-            <a:r>
-              <a:rPr lang="en-US" dirty="0"/>
-              <a:t> </a:t>
-            </a:r>
-            <a:r>
-              <a:rPr lang="en-US" dirty="0" err="1"/>
-              <a:t>datasæts</a:t>
-            </a:r>
-            <a:endParaRPr lang="en-US" dirty="0"/>
-          </a:p>
-          <a:p>
-            <a:r>
-              <a:rPr lang="en-US" dirty="0" err="1"/>
-              <a:t>Egen</a:t>
-            </a:r>
-            <a:r>
-              <a:rPr lang="en-US" dirty="0"/>
-              <a:t> </a:t>
-            </a:r>
-            <a:r>
-              <a:rPr lang="en-US" dirty="0" err="1"/>
-              <a:t>opdeling</a:t>
-            </a:r>
-            <a:r>
-              <a:rPr lang="en-US" dirty="0"/>
-              <a:t> </a:t>
-            </a:r>
-            <a:r>
-              <a:rPr lang="en-US" dirty="0" err="1"/>
-              <a:t>af</a:t>
-            </a:r>
-            <a:r>
-              <a:rPr lang="en-US" dirty="0"/>
-              <a:t> </a:t>
-            </a:r>
-            <a:r>
-              <a:rPr lang="en-US" dirty="0" err="1"/>
-              <a:t>træning</a:t>
-            </a:r>
-            <a:r>
-              <a:rPr lang="en-US" dirty="0"/>
-              <a:t> </a:t>
-            </a:r>
-            <a:r>
-              <a:rPr lang="en-US" dirty="0" err="1"/>
-              <a:t>og</a:t>
-            </a:r>
-            <a:r>
-              <a:rPr lang="en-US" dirty="0"/>
-              <a:t> test data</a:t>
-            </a:r>
-          </a:p>
-          <a:p>
-            <a:pPr lvl="1"/>
-            <a:r>
-              <a:rPr lang="en-US" dirty="0"/>
-              <a:t>Test data 25 % </a:t>
-            </a:r>
-            <a:r>
-              <a:rPr lang="en-US" dirty="0" err="1"/>
-              <a:t>af</a:t>
-            </a:r>
-            <a:r>
-              <a:rPr lang="en-US" dirty="0"/>
-              <a:t> det </a:t>
-            </a:r>
-            <a:r>
-              <a:rPr lang="en-US" dirty="0" err="1"/>
-              <a:t>fulde</a:t>
-            </a:r>
-            <a:r>
-              <a:rPr lang="en-US" dirty="0"/>
-              <a:t> </a:t>
-            </a:r>
-            <a:r>
-              <a:rPr lang="en-US" dirty="0" err="1"/>
-              <a:t>datasæt</a:t>
-            </a:r>
-            <a:endParaRPr lang="da-DK" dirty="0"/>
-          </a:p>
-        </p:txBody>
-      </p:sp>
-      <p:sp>
-        <p:nvSpPr>
-          <p:cNvPr id="7" name="Text Placeholder 6">
-            <a:extLst>
-              <a:ext uri="{FF2B5EF4-FFF2-40B4-BE49-F238E27FC236}">
-                <a16:creationId xmlns:a16="http://schemas.microsoft.com/office/drawing/2014/main" id="{5830593D-3C06-2904-C24F-A6C89E872ECB}"/>
-              </a:ext>
-            </a:extLst>
-          </p:cNvPr>
-          <p:cNvSpPr>
-            <a:spLocks noGrp="1"/>
-          </p:cNvSpPr>
-          <p:nvPr>
-            <p:ph type="body" sz="quarter" idx="3"/>
-          </p:nvPr>
-        </p:nvSpPr>
-        <p:spPr/>
-        <p:txBody>
-          <a:bodyPr/>
-          <a:lstStyle/>
-          <a:p>
-            <a:r>
-              <a:rPr lang="en-US" dirty="0" err="1"/>
-              <a:t>Klassifierer</a:t>
-            </a:r>
-            <a:endParaRPr lang="da-DK" dirty="0"/>
-          </a:p>
-        </p:txBody>
-      </p:sp>
-      <p:sp>
-        <p:nvSpPr>
-          <p:cNvPr id="8" name="Content Placeholder 7">
-            <a:extLst>
-              <a:ext uri="{FF2B5EF4-FFF2-40B4-BE49-F238E27FC236}">
-                <a16:creationId xmlns:a16="http://schemas.microsoft.com/office/drawing/2014/main" id="{D1EFBC77-BBF5-C514-A37F-9DD2F4F3C80B}"/>
-              </a:ext>
-            </a:extLst>
-          </p:cNvPr>
-          <p:cNvSpPr>
-            <a:spLocks noGrp="1"/>
-          </p:cNvSpPr>
-          <p:nvPr>
-            <p:ph sz="quarter" idx="4"/>
-          </p:nvPr>
-        </p:nvSpPr>
-        <p:spPr/>
-        <p:txBody>
-          <a:bodyPr>
-            <a:normAutofit fontScale="92500" lnSpcReduction="20000"/>
-          </a:bodyPr>
-          <a:lstStyle/>
-          <a:p>
-            <a:r>
-              <a:rPr lang="en-US" dirty="0"/>
-              <a:t>K-nearest </a:t>
-            </a:r>
-            <a:r>
-              <a:rPr lang="en-US" dirty="0" err="1"/>
-              <a:t>Neighbour</a:t>
-            </a:r>
-            <a:endParaRPr lang="en-US" dirty="0"/>
-          </a:p>
-          <a:p>
-            <a:r>
-              <a:rPr lang="en-US" dirty="0"/>
-              <a:t>Linear Stochastic Gradient </a:t>
-            </a:r>
-            <a:r>
-              <a:rPr lang="en-US" dirty="0" err="1"/>
-              <a:t>Desent</a:t>
-            </a:r>
-            <a:endParaRPr lang="en-US" dirty="0"/>
-          </a:p>
-          <a:p>
-            <a:r>
-              <a:rPr lang="en-US" dirty="0"/>
-              <a:t>Linear Support Vector </a:t>
-            </a:r>
-            <a:r>
-              <a:rPr lang="en-US" dirty="0" err="1"/>
-              <a:t>Classication</a:t>
-            </a:r>
-            <a:endParaRPr lang="en-US" dirty="0"/>
-          </a:p>
-          <a:p>
-            <a:r>
-              <a:rPr lang="en-US" dirty="0"/>
-              <a:t>Support Vector Classification with Linear Kernel</a:t>
-            </a:r>
-          </a:p>
-          <a:p>
-            <a:r>
-              <a:rPr lang="en-US" dirty="0"/>
-              <a:t>Gaussian Naïve Bayes</a:t>
-            </a:r>
-          </a:p>
-          <a:p>
-            <a:r>
-              <a:rPr lang="en-US" dirty="0"/>
-              <a:t>Decision Tree Classifier</a:t>
-            </a:r>
-          </a:p>
-          <a:p>
-            <a:r>
-              <a:rPr lang="en-US" dirty="0"/>
-              <a:t>Multi-Layer Perceptron Neural Network</a:t>
             </a:r>
             <a:endParaRPr lang="da-DK" dirty="0"/>
           </a:p>
@@ -6400,7 +6787,7 @@
     </p:spTree>
     <p:extLst>
       <p:ext uri="{BB962C8B-B14F-4D97-AF65-F5344CB8AC3E}">
-        <p14:creationId xmlns:p14="http://schemas.microsoft.com/office/powerpoint/2010/main" val="3557959645"/>
+        <p14:creationId xmlns:p14="http://schemas.microsoft.com/office/powerpoint/2010/main" val="3024169991"/>
       </p:ext>
     </p:extLst>
   </p:cSld>
@@ -6432,7 +6819,7 @@
           <p:cNvPr id="2" name="Title 1">
             <a:extLst>
               <a:ext uri="{FF2B5EF4-FFF2-40B4-BE49-F238E27FC236}">
-                <a16:creationId xmlns:a16="http://schemas.microsoft.com/office/drawing/2014/main" id="{4C39EC9B-1F70-5C70-0EEF-45B4DD4C5898}"/>
+                <a16:creationId xmlns:a16="http://schemas.microsoft.com/office/drawing/2014/main" id="{7D1ED1D4-302E-48E5-4DBF-1BE26F5D624F}"/>
               </a:ext>
             </a:extLst>
           </p:cNvPr>
@@ -6449,12 +6836,8 @@
           <a:lstStyle/>
           <a:p>
             <a:r>
-              <a:rPr lang="en-US" dirty="0" err="1"/>
-              <a:t>Forfatter</a:t>
-            </a:r>
-            <a:r>
-              <a:rPr lang="en-US" dirty="0"/>
-              <a:t> data</a:t>
+              <a:rPr lang="en-US" dirty="0"/>
+              <a:t>Set-up</a:t>
             </a:r>
             <a:endParaRPr lang="da-DK" dirty="0"/>
           </a:p>
@@ -6462,10 +6845,10 @@
       </p:sp>
       <p:sp>
         <p:nvSpPr>
-          <p:cNvPr id="3" name="Text Placeholder 2">
-            <a:extLst>
-              <a:ext uri="{FF2B5EF4-FFF2-40B4-BE49-F238E27FC236}">
-                <a16:creationId xmlns:a16="http://schemas.microsoft.com/office/drawing/2014/main" id="{5F3F570B-97B2-4868-8E27-152ADFFDDC9F}"/>
+          <p:cNvPr id="6" name="Text Placeholder 5">
+            <a:extLst>
+              <a:ext uri="{FF2B5EF4-FFF2-40B4-BE49-F238E27FC236}">
+                <a16:creationId xmlns:a16="http://schemas.microsoft.com/office/drawing/2014/main" id="{B22FAC0C-E14F-636B-3BBF-29D53FC74A56}"/>
               </a:ext>
             </a:extLst>
           </p:cNvPr>
@@ -6482,54 +6865,136 @@
           <a:lstStyle/>
           <a:p>
             <a:r>
-              <a:rPr lang="en-US" dirty="0"/>
-              <a:t>Test</a:t>
+              <a:rPr lang="en-US" dirty="0" err="1"/>
+              <a:t>Datasæts</a:t>
             </a:r>
             <a:endParaRPr lang="da-DK" dirty="0"/>
           </a:p>
         </p:txBody>
       </p:sp>
-      <p:pic>
-        <p:nvPicPr>
-          <p:cNvPr id="8" name="Content Placeholder 7" descr="A picture containing chart&#10;&#10;Description automatically generated">
-            <a:extLst>
-              <a:ext uri="{FF2B5EF4-FFF2-40B4-BE49-F238E27FC236}">
-                <a16:creationId xmlns:a16="http://schemas.microsoft.com/office/drawing/2014/main" id="{70BCD161-9BF4-84E7-327B-B36B661DEFAA}"/>
-              </a:ext>
-            </a:extLst>
-          </p:cNvPr>
-          <p:cNvPicPr>
-            <a:picLocks noGrp="1" noChangeAspect="1"/>
-          </p:cNvPicPr>
+      <p:sp>
+        <p:nvSpPr>
+          <p:cNvPr id="4" name="Content Placeholder 3">
+            <a:extLst>
+              <a:ext uri="{FF2B5EF4-FFF2-40B4-BE49-F238E27FC236}">
+                <a16:creationId xmlns:a16="http://schemas.microsoft.com/office/drawing/2014/main" id="{2F6908E3-6783-4DE7-0F2F-A855EE823C0A}"/>
+              </a:ext>
+            </a:extLst>
+          </p:cNvPr>
+          <p:cNvSpPr>
+            <a:spLocks noGrp="1"/>
+          </p:cNvSpPr>
           <p:nvPr>
             <p:ph sz="half" idx="2"/>
           </p:nvPr>
-        </p:nvPicPr>
-        <p:blipFill>
-          <a:blip r:embed="rId2">
-            <a:extLst>
-              <a:ext uri="{28A0092B-C50C-407E-A947-70E740481C1C}">
-                <a14:useLocalDpi xmlns:a14="http://schemas.microsoft.com/office/drawing/2010/main" val="0"/>
-              </a:ext>
-            </a:extLst>
-          </a:blip>
-          <a:stretch>
-            <a:fillRect/>
-          </a:stretch>
-        </p:blipFill>
-        <p:spPr>
-          <a:xfrm>
-            <a:off x="839788" y="3057922"/>
-            <a:ext cx="5157787" cy="2578893"/>
-          </a:xfrm>
-        </p:spPr>
-      </p:pic>
-      <p:sp>
-        <p:nvSpPr>
-          <p:cNvPr id="5" name="Text Placeholder 4">
-            <a:extLst>
-              <a:ext uri="{FF2B5EF4-FFF2-40B4-BE49-F238E27FC236}">
-                <a16:creationId xmlns:a16="http://schemas.microsoft.com/office/drawing/2014/main" id="{57DCCF0A-81B0-AFA5-2150-518FA24C5977}"/>
+        </p:nvSpPr>
+        <p:spPr/>
+        <p:txBody>
+          <a:bodyPr>
+            <a:normAutofit fontScale="92500" lnSpcReduction="20000"/>
+          </a:bodyPr>
+          <a:lstStyle/>
+          <a:p>
+            <a:r>
+              <a:rPr lang="en-US" dirty="0" err="1"/>
+              <a:t>Forfatterens</a:t>
+            </a:r>
+            <a:r>
+              <a:rPr lang="en-US" dirty="0"/>
+              <a:t> </a:t>
+            </a:r>
+            <a:r>
+              <a:rPr lang="en-US" dirty="0" err="1"/>
+              <a:t>egen</a:t>
+            </a:r>
+            <a:r>
+              <a:rPr lang="en-US" dirty="0"/>
+              <a:t> </a:t>
+            </a:r>
+            <a:r>
+              <a:rPr lang="en-US" dirty="0" err="1"/>
+              <a:t>opdeling</a:t>
+            </a:r>
+            <a:endParaRPr lang="en-US" dirty="0"/>
+          </a:p>
+          <a:p>
+            <a:r>
+              <a:rPr lang="en-US" dirty="0" err="1"/>
+              <a:t>Egen</a:t>
+            </a:r>
+            <a:r>
+              <a:rPr lang="en-US" dirty="0"/>
+              <a:t> </a:t>
+            </a:r>
+            <a:r>
+              <a:rPr lang="en-US" dirty="0" err="1"/>
+              <a:t>opdeling</a:t>
+            </a:r>
+            <a:r>
+              <a:rPr lang="en-US" dirty="0"/>
+              <a:t> </a:t>
+            </a:r>
+            <a:r>
+              <a:rPr lang="en-US" dirty="0" err="1"/>
+              <a:t>af</a:t>
+            </a:r>
+            <a:r>
+              <a:rPr lang="en-US" dirty="0"/>
+              <a:t> </a:t>
+            </a:r>
+            <a:r>
+              <a:rPr lang="en-US" dirty="0" err="1"/>
+              <a:t>træning</a:t>
+            </a:r>
+            <a:r>
+              <a:rPr lang="en-US" dirty="0"/>
+              <a:t> </a:t>
+            </a:r>
+            <a:r>
+              <a:rPr lang="en-US" dirty="0" err="1"/>
+              <a:t>og</a:t>
+            </a:r>
+            <a:r>
+              <a:rPr lang="en-US" dirty="0"/>
+              <a:t> test data</a:t>
+            </a:r>
+          </a:p>
+          <a:p>
+            <a:pPr lvl="1"/>
+            <a:r>
+              <a:rPr lang="en-US" dirty="0"/>
+              <a:t>Test data 25 % </a:t>
+            </a:r>
+            <a:r>
+              <a:rPr lang="en-US" dirty="0" err="1"/>
+              <a:t>af</a:t>
+            </a:r>
+            <a:r>
+              <a:rPr lang="en-US" dirty="0"/>
+              <a:t> det </a:t>
+            </a:r>
+            <a:r>
+              <a:rPr lang="en-US" dirty="0" err="1"/>
+              <a:t>fulde</a:t>
+            </a:r>
+            <a:r>
+              <a:rPr lang="en-US" dirty="0"/>
+              <a:t> </a:t>
+            </a:r>
+            <a:r>
+              <a:rPr lang="en-US" dirty="0" err="1"/>
+              <a:t>datasæt</a:t>
+            </a:r>
+            <a:endParaRPr lang="da-DK" dirty="0"/>
+          </a:p>
+        </p:txBody>
+      </p:sp>
+      <p:sp>
+        <p:nvSpPr>
+          <p:cNvPr id="7" name="Text Placeholder 6">
+            <a:extLst>
+              <a:ext uri="{FF2B5EF4-FFF2-40B4-BE49-F238E27FC236}">
+                <a16:creationId xmlns:a16="http://schemas.microsoft.com/office/drawing/2014/main" id="{5830593D-3C06-2904-C24F-A6C89E872ECB}"/>
               </a:ext>
             </a:extLst>
           </p:cNvPr>
@@ -6547,51 +7012,98 @@
           <a:p>
             <a:r>
               <a:rPr lang="en-US" dirty="0" err="1"/>
-              <a:t>Træn</a:t>
+              <a:t>Klassifierer</a:t>
             </a:r>
             <a:endParaRPr lang="da-DK" dirty="0"/>
           </a:p>
         </p:txBody>
       </p:sp>
-      <p:pic>
-        <p:nvPicPr>
-          <p:cNvPr id="10" name="Content Placeholder 9" descr="Chart, bar chart, histogram&#10;&#10;Description automatically generated">
-            <a:extLst>
-              <a:ext uri="{FF2B5EF4-FFF2-40B4-BE49-F238E27FC236}">
-                <a16:creationId xmlns:a16="http://schemas.microsoft.com/office/drawing/2014/main" id="{17B75BF0-3106-70F3-7F6E-A14D1BF5F881}"/>
-              </a:ext>
-            </a:extLst>
-          </p:cNvPr>
-          <p:cNvPicPr>
-            <a:picLocks noGrp="1" noChangeAspect="1"/>
-          </p:cNvPicPr>
+      <p:sp>
+        <p:nvSpPr>
+          <p:cNvPr id="8" name="Content Placeholder 7">
+            <a:extLst>
+              <a:ext uri="{FF2B5EF4-FFF2-40B4-BE49-F238E27FC236}">
+                <a16:creationId xmlns:a16="http://schemas.microsoft.com/office/drawing/2014/main" id="{D1EFBC77-BBF5-C514-A37F-9DD2F4F3C80B}"/>
+              </a:ext>
+            </a:extLst>
+          </p:cNvPr>
+          <p:cNvSpPr>
+            <a:spLocks noGrp="1"/>
+          </p:cNvSpPr>
           <p:nvPr>
             <p:ph sz="quarter" idx="4"/>
           </p:nvPr>
-        </p:nvPicPr>
-        <p:blipFill>
-          <a:blip r:embed="rId3">
-            <a:extLst>
-              <a:ext uri="{28A0092B-C50C-407E-A947-70E740481C1C}">
-                <a14:useLocalDpi xmlns:a14="http://schemas.microsoft.com/office/drawing/2010/main" val="0"/>
-              </a:ext>
-            </a:extLst>
-          </a:blip>
-          <a:stretch>
-            <a:fillRect/>
-          </a:stretch>
-        </p:blipFill>
-        <p:spPr>
-          <a:xfrm>
-            <a:off x="6172200" y="3051572"/>
-            <a:ext cx="5183188" cy="2591594"/>
-          </a:xfrm>
-        </p:spPr>
-      </p:pic>
+        </p:nvSpPr>
+        <p:spPr/>
+        <p:txBody>
+          <a:bodyPr>
+            <a:normAutofit fontScale="92500" lnSpcReduction="20000"/>
+          </a:bodyPr>
+          <a:lstStyle/>
+          <a:p>
+            <a:r>
+              <a:rPr lang="en-US" dirty="0"/>
+              <a:t>K-nearest </a:t>
+            </a:r>
+            <a:r>
+              <a:rPr lang="en-US" dirty="0" err="1"/>
+              <a:t>Neighbour</a:t>
+            </a:r>
+            <a:endParaRPr lang="en-US" dirty="0"/>
+          </a:p>
+          <a:p>
+            <a:r>
+              <a:rPr lang="en-US" dirty="0"/>
+              <a:t>Linear Stochastic Gradient </a:t>
+            </a:r>
+            <a:r>
+              <a:rPr lang="en-US" dirty="0" err="1"/>
+              <a:t>Desent</a:t>
+            </a:r>
+            <a:endParaRPr lang="en-US" dirty="0"/>
+          </a:p>
+          <a:p>
+            <a:r>
+              <a:rPr lang="en-US" dirty="0"/>
+              <a:t>Linear Support Vector </a:t>
+            </a:r>
+            <a:r>
+              <a:rPr lang="en-US" dirty="0" err="1"/>
+              <a:t>Classication</a:t>
+            </a:r>
+            <a:endParaRPr lang="en-US" dirty="0"/>
+          </a:p>
+          <a:p>
+            <a:r>
+              <a:rPr lang="en-US" dirty="0"/>
+              <a:t>Support Vector Classification with Linear Kernel</a:t>
+            </a:r>
+          </a:p>
+          <a:p>
+            <a:r>
+              <a:rPr lang="en-US" dirty="0"/>
+              <a:t>Gaussian Naïve Bayes</a:t>
+            </a:r>
+          </a:p>
+          <a:p>
+            <a:r>
+              <a:rPr lang="en-US" dirty="0"/>
+              <a:t>Decision Tree Classifier</a:t>
+            </a:r>
+          </a:p>
+          <a:p>
+            <a:r>
+              <a:rPr lang="en-US" dirty="0"/>
+              <a:t>Multi-Layer Perceptron Neural Network</a:t>
+            </a:r>
+            <a:endParaRPr lang="da-DK" dirty="0"/>
+          </a:p>
+        </p:txBody>
+      </p:sp>
     </p:spTree>
     <p:extLst>
       <p:ext uri="{BB962C8B-B14F-4D97-AF65-F5344CB8AC3E}">
-        <p14:creationId xmlns:p14="http://schemas.microsoft.com/office/powerpoint/2010/main" val="4076824167"/>
+        <p14:creationId xmlns:p14="http://schemas.microsoft.com/office/powerpoint/2010/main" val="3557959645"/>
       </p:ext>
     </p:extLst>
   </p:cSld>
@@ -6623,7 +7135,7 @@
           <p:cNvPr id="2" name="Title 1">
             <a:extLst>
               <a:ext uri="{FF2B5EF4-FFF2-40B4-BE49-F238E27FC236}">
-                <a16:creationId xmlns:a16="http://schemas.microsoft.com/office/drawing/2014/main" id="{18BE47AF-DB62-A43E-9FA8-93130480FC1B}"/>
+                <a16:creationId xmlns:a16="http://schemas.microsoft.com/office/drawing/2014/main" id="{4C39EC9B-1F70-5C70-0EEF-45B4DD4C5898}"/>
               </a:ext>
             </a:extLst>
           </p:cNvPr>
@@ -6641,7 +7153,7 @@
           <a:p>
             <a:r>
               <a:rPr lang="en-US" dirty="0" err="1"/>
-              <a:t>Egen</a:t>
+              <a:t>Forfatter</a:t>
             </a:r>
             <a:r>
               <a:rPr lang="en-US" dirty="0"/>
@@ -6656,7 +7168,7 @@
           <p:cNvPr id="3" name="Text Placeholder 2">
             <a:extLst>
               <a:ext uri="{FF2B5EF4-FFF2-40B4-BE49-F238E27FC236}">
-                <a16:creationId xmlns:a16="http://schemas.microsoft.com/office/drawing/2014/main" id="{38C8F29B-7D00-5B52-8882-6738495519C7}"/>
+                <a16:creationId xmlns:a16="http://schemas.microsoft.com/office/drawing/2014/main" id="{5F3F570B-97B2-4868-8E27-152ADFFDDC9F}"/>
               </a:ext>
             </a:extLst>
           </p:cNvPr>
@@ -6685,7 +7197,7 @@
           <p:cNvPr id="8" name="Content Placeholder 7" descr="A picture containing chart&#10;&#10;Description automatically generated">
             <a:extLst>
               <a:ext uri="{FF2B5EF4-FFF2-40B4-BE49-F238E27FC236}">
-                <a16:creationId xmlns:a16="http://schemas.microsoft.com/office/drawing/2014/main" id="{279CACC2-1F1E-6D91-267E-5F2119C4E4F5}"/>
+                <a16:creationId xmlns:a16="http://schemas.microsoft.com/office/drawing/2014/main" id="{70BCD161-9BF4-84E7-327B-B36B661DEFAA}"/>
               </a:ext>
             </a:extLst>
           </p:cNvPr>
@@ -6697,7 +7209,7 @@
           </p:nvPr>
         </p:nvPicPr>
         <p:blipFill>
-          <a:blip r:embed="rId2">
+          <a:blip r:embed="rId3">
             <a:extLst>
               <a:ext uri="{28A0092B-C50C-407E-A947-70E740481C1C}">
                 <a14:useLocalDpi xmlns:a14="http://schemas.microsoft.com/office/drawing/2010/main" val="0"/>
@@ -6720,7 +7232,7 @@
           <p:cNvPr id="5" name="Text Placeholder 4">
             <a:extLst>
               <a:ext uri="{FF2B5EF4-FFF2-40B4-BE49-F238E27FC236}">
-                <a16:creationId xmlns:a16="http://schemas.microsoft.com/office/drawing/2014/main" id="{7B657FD8-78FA-C97E-0BB9-302D62C0D280}"/>
+                <a16:creationId xmlns:a16="http://schemas.microsoft.com/office/drawing/2014/main" id="{57DCCF0A-81B0-AFA5-2150-518FA24C5977}"/>
               </a:ext>
             </a:extLst>
           </p:cNvPr>
@@ -6746,10 +7258,10 @@
       </p:sp>
       <p:pic>
         <p:nvPicPr>
-          <p:cNvPr id="10" name="Content Placeholder 9" descr="A picture containing chart&#10;&#10;Description automatically generated">
-            <a:extLst>
-              <a:ext uri="{FF2B5EF4-FFF2-40B4-BE49-F238E27FC236}">
-                <a16:creationId xmlns:a16="http://schemas.microsoft.com/office/drawing/2014/main" id="{D2CADDE7-5B4A-7EC7-1687-86EAC2F33618}"/>
+          <p:cNvPr id="10" name="Content Placeholder 9" descr="Chart, bar chart, histogram&#10;&#10;Description automatically generated">
+            <a:extLst>
+              <a:ext uri="{FF2B5EF4-FFF2-40B4-BE49-F238E27FC236}">
+                <a16:creationId xmlns:a16="http://schemas.microsoft.com/office/drawing/2014/main" id="{17B75BF0-3106-70F3-7F6E-A14D1BF5F881}"/>
               </a:ext>
             </a:extLst>
           </p:cNvPr>
@@ -6761,7 +7273,7 @@
           </p:nvPr>
         </p:nvPicPr>
         <p:blipFill>
-          <a:blip r:embed="rId3">
+          <a:blip r:embed="rId4">
             <a:extLst>
               <a:ext uri="{28A0092B-C50C-407E-A947-70E740481C1C}">
                 <a14:useLocalDpi xmlns:a14="http://schemas.microsoft.com/office/drawing/2010/main" val="0"/>
@@ -6782,7 +7294,7 @@
     </p:spTree>
     <p:extLst>
       <p:ext uri="{BB962C8B-B14F-4D97-AF65-F5344CB8AC3E}">
-        <p14:creationId xmlns:p14="http://schemas.microsoft.com/office/powerpoint/2010/main" val="2848564023"/>
+        <p14:creationId xmlns:p14="http://schemas.microsoft.com/office/powerpoint/2010/main" val="4076824167"/>
       </p:ext>
     </p:extLst>
   </p:cSld>

</xml_diff>